<commit_message>
Added My Part of Retrospective
</commit_message>
<xml_diff>
--- a/Presentations/Final_Retrospective.pptx
+++ b/Presentations/Final_Retrospective.pptx
@@ -1,21 +1,116 @@
 
 <file path=ppt/presentation.xml><?xml version="1.0" encoding="utf-8"?>
-<p:presentation xmlns:a="http://schemas.openxmlformats.org/drawingml/2006/main" xmlns:p="http://schemas.openxmlformats.org/presentationml/2006/main" xmlns:r="http://schemas.openxmlformats.org/officeDocument/2006/relationships" xmlns:p14="http://schemas.microsoft.com/office/powerpoint/2010/main" xmlns:p15="http://schemas.microsoft.com/office/powerpoint/2012/main" xmlns:mc="http://schemas.openxmlformats.org/markup-compatibility/2006">
+<p:presentation xmlns:a="http://schemas.openxmlformats.org/drawingml/2006/main" xmlns:r="http://schemas.openxmlformats.org/officeDocument/2006/relationships" xmlns:p="http://schemas.openxmlformats.org/presentationml/2006/main">
   <p:sldMasterIdLst>
-    <p:sldMasterId id="2147483648" r:id="rId2"/>
+    <p:sldMasterId id="2147483648" r:id="rId1"/>
   </p:sldMasterIdLst>
   <p:sldIdLst>
-    <p:sldId id="256" r:id="rId3"/>
-    <p:sldId id="257" r:id="rId4"/>
-    <p:sldId id="258" r:id="rId5"/>
+    <p:sldId id="256" r:id="rId2"/>
+    <p:sldId id="257" r:id="rId3"/>
+    <p:sldId id="258" r:id="rId4"/>
   </p:sldIdLst>
   <p:sldSz cx="12192000" cy="6858000"/>
   <p:notesSz cx="7772400" cy="10058400"/>
+  <p:defaultTextStyle>
+    <a:defPPr>
+      <a:defRPr lang="en-US"/>
+    </a:defPPr>
+    <a:lvl1pPr marL="0" algn="l" defTabSz="914400" rtl="0" eaLnBrk="1" latinLnBrk="0" hangingPunct="1">
+      <a:defRPr sz="1800" kern="1200">
+        <a:solidFill>
+          <a:schemeClr val="tx1"/>
+        </a:solidFill>
+        <a:latin typeface="+mn-lt"/>
+        <a:ea typeface="+mn-ea"/>
+        <a:cs typeface="+mn-cs"/>
+      </a:defRPr>
+    </a:lvl1pPr>
+    <a:lvl2pPr marL="457200" algn="l" defTabSz="914400" rtl="0" eaLnBrk="1" latinLnBrk="0" hangingPunct="1">
+      <a:defRPr sz="1800" kern="1200">
+        <a:solidFill>
+          <a:schemeClr val="tx1"/>
+        </a:solidFill>
+        <a:latin typeface="+mn-lt"/>
+        <a:ea typeface="+mn-ea"/>
+        <a:cs typeface="+mn-cs"/>
+      </a:defRPr>
+    </a:lvl2pPr>
+    <a:lvl3pPr marL="914400" algn="l" defTabSz="914400" rtl="0" eaLnBrk="1" latinLnBrk="0" hangingPunct="1">
+      <a:defRPr sz="1800" kern="1200">
+        <a:solidFill>
+          <a:schemeClr val="tx1"/>
+        </a:solidFill>
+        <a:latin typeface="+mn-lt"/>
+        <a:ea typeface="+mn-ea"/>
+        <a:cs typeface="+mn-cs"/>
+      </a:defRPr>
+    </a:lvl3pPr>
+    <a:lvl4pPr marL="1371600" algn="l" defTabSz="914400" rtl="0" eaLnBrk="1" latinLnBrk="0" hangingPunct="1">
+      <a:defRPr sz="1800" kern="1200">
+        <a:solidFill>
+          <a:schemeClr val="tx1"/>
+        </a:solidFill>
+        <a:latin typeface="+mn-lt"/>
+        <a:ea typeface="+mn-ea"/>
+        <a:cs typeface="+mn-cs"/>
+      </a:defRPr>
+    </a:lvl4pPr>
+    <a:lvl5pPr marL="1828800" algn="l" defTabSz="914400" rtl="0" eaLnBrk="1" latinLnBrk="0" hangingPunct="1">
+      <a:defRPr sz="1800" kern="1200">
+        <a:solidFill>
+          <a:schemeClr val="tx1"/>
+        </a:solidFill>
+        <a:latin typeface="+mn-lt"/>
+        <a:ea typeface="+mn-ea"/>
+        <a:cs typeface="+mn-cs"/>
+      </a:defRPr>
+    </a:lvl5pPr>
+    <a:lvl6pPr marL="2286000" algn="l" defTabSz="914400" rtl="0" eaLnBrk="1" latinLnBrk="0" hangingPunct="1">
+      <a:defRPr sz="1800" kern="1200">
+        <a:solidFill>
+          <a:schemeClr val="tx1"/>
+        </a:solidFill>
+        <a:latin typeface="+mn-lt"/>
+        <a:ea typeface="+mn-ea"/>
+        <a:cs typeface="+mn-cs"/>
+      </a:defRPr>
+    </a:lvl6pPr>
+    <a:lvl7pPr marL="2743200" algn="l" defTabSz="914400" rtl="0" eaLnBrk="1" latinLnBrk="0" hangingPunct="1">
+      <a:defRPr sz="1800" kern="1200">
+        <a:solidFill>
+          <a:schemeClr val="tx1"/>
+        </a:solidFill>
+        <a:latin typeface="+mn-lt"/>
+        <a:ea typeface="+mn-ea"/>
+        <a:cs typeface="+mn-cs"/>
+      </a:defRPr>
+    </a:lvl7pPr>
+    <a:lvl8pPr marL="3200400" algn="l" defTabSz="914400" rtl="0" eaLnBrk="1" latinLnBrk="0" hangingPunct="1">
+      <a:defRPr sz="1800" kern="1200">
+        <a:solidFill>
+          <a:schemeClr val="tx1"/>
+        </a:solidFill>
+        <a:latin typeface="+mn-lt"/>
+        <a:ea typeface="+mn-ea"/>
+        <a:cs typeface="+mn-cs"/>
+      </a:defRPr>
+    </a:lvl8pPr>
+    <a:lvl9pPr marL="3657600" algn="l" defTabSz="914400" rtl="0" eaLnBrk="1" latinLnBrk="0" hangingPunct="1">
+      <a:defRPr sz="1800" kern="1200">
+        <a:solidFill>
+          <a:schemeClr val="tx1"/>
+        </a:solidFill>
+        <a:latin typeface="+mn-lt"/>
+        <a:ea typeface="+mn-ea"/>
+        <a:cs typeface="+mn-cs"/>
+      </a:defRPr>
+    </a:lvl9pPr>
+  </p:defaultTextStyle>
 </p:presentation>
 </file>
 
 <file path=ppt/slideLayouts/slideLayout1.xml><?xml version="1.0" encoding="utf-8"?>
-<p:sldLayout xmlns:a="http://schemas.openxmlformats.org/drawingml/2006/main" xmlns:p="http://schemas.openxmlformats.org/presentationml/2006/main" xmlns:r="http://schemas.openxmlformats.org/officeDocument/2006/relationships" xmlns:p14="http://schemas.microsoft.com/office/powerpoint/2010/main" xmlns:p15="http://schemas.microsoft.com/office/powerpoint/2012/main" xmlns:mc="http://schemas.openxmlformats.org/markup-compatibility/2006" type="blank" preserve="1">
+<p:sldLayout xmlns:a="http://schemas.openxmlformats.org/drawingml/2006/main" xmlns:r="http://schemas.openxmlformats.org/officeDocument/2006/relationships" xmlns:p="http://schemas.openxmlformats.org/presentationml/2006/main" type="blank" preserve="1">
   <p:cSld name="Blank Slide">
     <p:spTree>
       <p:nvGrpSpPr>
@@ -33,11 +128,14 @@
       </p:grpSpPr>
     </p:spTree>
   </p:cSld>
+  <p:clrMapOvr>
+    <a:masterClrMapping/>
+  </p:clrMapOvr>
 </p:sldLayout>
 </file>
 
 <file path=ppt/slideLayouts/slideLayout10.xml><?xml version="1.0" encoding="utf-8"?>
-<p:sldLayout xmlns:a="http://schemas.openxmlformats.org/drawingml/2006/main" xmlns:p="http://schemas.openxmlformats.org/presentationml/2006/main" xmlns:r="http://schemas.openxmlformats.org/officeDocument/2006/relationships" xmlns:p14="http://schemas.microsoft.com/office/powerpoint/2010/main" xmlns:p15="http://schemas.microsoft.com/office/powerpoint/2012/main" xmlns:mc="http://schemas.openxmlformats.org/markup-compatibility/2006" type="objOverTx" preserve="1">
+<p:sldLayout xmlns:a="http://schemas.openxmlformats.org/drawingml/2006/main" xmlns:r="http://schemas.openxmlformats.org/officeDocument/2006/relationships" xmlns:p="http://schemas.openxmlformats.org/presentationml/2006/main" type="objOverTx" preserve="1">
   <p:cSld name="Title, Content over Content">
     <p:spTree>
       <p:nvGrpSpPr>
@@ -73,15 +171,16 @@
           </a:prstGeom>
         </p:spPr>
         <p:txBody>
-          <a:bodyPr lIns="0" rIns="0" tIns="0" bIns="0" anchor="ctr"/>
-          <a:p>
-            <a:endParaRPr b="0" lang="en-US" sz="1800" spc="-1" strike="noStrike">
-              <a:solidFill>
-                <a:srgbClr val="000000"/>
-              </a:solidFill>
-              <a:uFill>
-                <a:solidFill>
-                  <a:srgbClr val="ffffff"/>
+          <a:bodyPr lIns="0" tIns="0" rIns="0" bIns="0" anchor="ctr"/>
+          <a:lstStyle/>
+          <a:p>
+            <a:endParaRPr lang="en-US" sz="1800" b="0" strike="noStrike" spc="-1">
+              <a:solidFill>
+                <a:srgbClr val="000000"/>
+              </a:solidFill>
+              <a:uFill>
+                <a:solidFill>
+                  <a:srgbClr val="FFFFFF"/>
                 </a:solidFill>
               </a:uFill>
               <a:latin typeface="Century Gothic"/>
@@ -109,15 +208,16 @@
           </a:prstGeom>
         </p:spPr>
         <p:txBody>
-          <a:bodyPr lIns="0" rIns="0" tIns="0" bIns="0"/>
-          <a:p>
-            <a:endParaRPr b="0" lang="en-US" sz="1800" spc="-1" strike="noStrike">
-              <a:solidFill>
-                <a:srgbClr val="000000"/>
-              </a:solidFill>
-              <a:uFill>
-                <a:solidFill>
-                  <a:srgbClr val="ffffff"/>
+          <a:bodyPr lIns="0" tIns="0" rIns="0" bIns="0"/>
+          <a:lstStyle/>
+          <a:p>
+            <a:endParaRPr lang="en-US" sz="1800" b="0" strike="noStrike" spc="-1">
+              <a:solidFill>
+                <a:srgbClr val="000000"/>
+              </a:solidFill>
+              <a:uFill>
+                <a:solidFill>
+                  <a:srgbClr val="FFFFFF"/>
                 </a:solidFill>
               </a:uFill>
               <a:latin typeface="Century Gothic"/>
@@ -145,15 +245,16 @@
           </a:prstGeom>
         </p:spPr>
         <p:txBody>
-          <a:bodyPr lIns="0" rIns="0" tIns="0" bIns="0"/>
-          <a:p>
-            <a:endParaRPr b="0" lang="en-US" sz="1800" spc="-1" strike="noStrike">
-              <a:solidFill>
-                <a:srgbClr val="000000"/>
-              </a:solidFill>
-              <a:uFill>
-                <a:solidFill>
-                  <a:srgbClr val="ffffff"/>
+          <a:bodyPr lIns="0" tIns="0" rIns="0" bIns="0"/>
+          <a:lstStyle/>
+          <a:p>
+            <a:endParaRPr lang="en-US" sz="1800" b="0" strike="noStrike" spc="-1">
+              <a:solidFill>
+                <a:srgbClr val="000000"/>
+              </a:solidFill>
+              <a:uFill>
+                <a:solidFill>
+                  <a:srgbClr val="FFFFFF"/>
                 </a:solidFill>
               </a:uFill>
               <a:latin typeface="Century Gothic"/>
@@ -163,11 +264,14 @@
       </p:sp>
     </p:spTree>
   </p:cSld>
+  <p:clrMapOvr>
+    <a:masterClrMapping/>
+  </p:clrMapOvr>
 </p:sldLayout>
 </file>
 
 <file path=ppt/slideLayouts/slideLayout11.xml><?xml version="1.0" encoding="utf-8"?>
-<p:sldLayout xmlns:a="http://schemas.openxmlformats.org/drawingml/2006/main" xmlns:p="http://schemas.openxmlformats.org/presentationml/2006/main" xmlns:r="http://schemas.openxmlformats.org/officeDocument/2006/relationships" xmlns:p14="http://schemas.microsoft.com/office/powerpoint/2010/main" xmlns:p15="http://schemas.microsoft.com/office/powerpoint/2012/main" xmlns:mc="http://schemas.openxmlformats.org/markup-compatibility/2006" type="fourObj" preserve="1">
+<p:sldLayout xmlns:a="http://schemas.openxmlformats.org/drawingml/2006/main" xmlns:r="http://schemas.openxmlformats.org/officeDocument/2006/relationships" xmlns:p="http://schemas.openxmlformats.org/presentationml/2006/main" type="fourObj" preserve="1">
   <p:cSld name="Title, 4 Content">
     <p:spTree>
       <p:nvGrpSpPr>
@@ -203,15 +307,16 @@
           </a:prstGeom>
         </p:spPr>
         <p:txBody>
-          <a:bodyPr lIns="0" rIns="0" tIns="0" bIns="0" anchor="ctr"/>
-          <a:p>
-            <a:endParaRPr b="0" lang="en-US" sz="1800" spc="-1" strike="noStrike">
-              <a:solidFill>
-                <a:srgbClr val="000000"/>
-              </a:solidFill>
-              <a:uFill>
-                <a:solidFill>
-                  <a:srgbClr val="ffffff"/>
+          <a:bodyPr lIns="0" tIns="0" rIns="0" bIns="0" anchor="ctr"/>
+          <a:lstStyle/>
+          <a:p>
+            <a:endParaRPr lang="en-US" sz="1800" b="0" strike="noStrike" spc="-1">
+              <a:solidFill>
+                <a:srgbClr val="000000"/>
+              </a:solidFill>
+              <a:uFill>
+                <a:solidFill>
+                  <a:srgbClr val="FFFFFF"/>
                 </a:solidFill>
               </a:uFill>
               <a:latin typeface="Century Gothic"/>
@@ -239,15 +344,16 @@
           </a:prstGeom>
         </p:spPr>
         <p:txBody>
-          <a:bodyPr lIns="0" rIns="0" tIns="0" bIns="0"/>
-          <a:p>
-            <a:endParaRPr b="0" lang="en-US" sz="1800" spc="-1" strike="noStrike">
-              <a:solidFill>
-                <a:srgbClr val="000000"/>
-              </a:solidFill>
-              <a:uFill>
-                <a:solidFill>
-                  <a:srgbClr val="ffffff"/>
+          <a:bodyPr lIns="0" tIns="0" rIns="0" bIns="0"/>
+          <a:lstStyle/>
+          <a:p>
+            <a:endParaRPr lang="en-US" sz="1800" b="0" strike="noStrike" spc="-1">
+              <a:solidFill>
+                <a:srgbClr val="000000"/>
+              </a:solidFill>
+              <a:uFill>
+                <a:solidFill>
+                  <a:srgbClr val="FFFFFF"/>
                 </a:solidFill>
               </a:uFill>
               <a:latin typeface="Century Gothic"/>
@@ -275,15 +381,16 @@
           </a:prstGeom>
         </p:spPr>
         <p:txBody>
-          <a:bodyPr lIns="0" rIns="0" tIns="0" bIns="0"/>
-          <a:p>
-            <a:endParaRPr b="0" lang="en-US" sz="1800" spc="-1" strike="noStrike">
-              <a:solidFill>
-                <a:srgbClr val="000000"/>
-              </a:solidFill>
-              <a:uFill>
-                <a:solidFill>
-                  <a:srgbClr val="ffffff"/>
+          <a:bodyPr lIns="0" tIns="0" rIns="0" bIns="0"/>
+          <a:lstStyle/>
+          <a:p>
+            <a:endParaRPr lang="en-US" sz="1800" b="0" strike="noStrike" spc="-1">
+              <a:solidFill>
+                <a:srgbClr val="000000"/>
+              </a:solidFill>
+              <a:uFill>
+                <a:solidFill>
+                  <a:srgbClr val="FFFFFF"/>
                 </a:solidFill>
               </a:uFill>
               <a:latin typeface="Century Gothic"/>
@@ -311,15 +418,16 @@
           </a:prstGeom>
         </p:spPr>
         <p:txBody>
-          <a:bodyPr lIns="0" rIns="0" tIns="0" bIns="0"/>
-          <a:p>
-            <a:endParaRPr b="0" lang="en-US" sz="1800" spc="-1" strike="noStrike">
-              <a:solidFill>
-                <a:srgbClr val="000000"/>
-              </a:solidFill>
-              <a:uFill>
-                <a:solidFill>
-                  <a:srgbClr val="ffffff"/>
+          <a:bodyPr lIns="0" tIns="0" rIns="0" bIns="0"/>
+          <a:lstStyle/>
+          <a:p>
+            <a:endParaRPr lang="en-US" sz="1800" b="0" strike="noStrike" spc="-1">
+              <a:solidFill>
+                <a:srgbClr val="000000"/>
+              </a:solidFill>
+              <a:uFill>
+                <a:solidFill>
+                  <a:srgbClr val="FFFFFF"/>
                 </a:solidFill>
               </a:uFill>
               <a:latin typeface="Century Gothic"/>
@@ -347,15 +455,16 @@
           </a:prstGeom>
         </p:spPr>
         <p:txBody>
-          <a:bodyPr lIns="0" rIns="0" tIns="0" bIns="0"/>
-          <a:p>
-            <a:endParaRPr b="0" lang="en-US" sz="1800" spc="-1" strike="noStrike">
-              <a:solidFill>
-                <a:srgbClr val="000000"/>
-              </a:solidFill>
-              <a:uFill>
-                <a:solidFill>
-                  <a:srgbClr val="ffffff"/>
+          <a:bodyPr lIns="0" tIns="0" rIns="0" bIns="0"/>
+          <a:lstStyle/>
+          <a:p>
+            <a:endParaRPr lang="en-US" sz="1800" b="0" strike="noStrike" spc="-1">
+              <a:solidFill>
+                <a:srgbClr val="000000"/>
+              </a:solidFill>
+              <a:uFill>
+                <a:solidFill>
+                  <a:srgbClr val="FFFFFF"/>
                 </a:solidFill>
               </a:uFill>
               <a:latin typeface="Century Gothic"/>
@@ -365,11 +474,14 @@
       </p:sp>
     </p:spTree>
   </p:cSld>
+  <p:clrMapOvr>
+    <a:masterClrMapping/>
+  </p:clrMapOvr>
 </p:sldLayout>
 </file>
 
 <file path=ppt/slideLayouts/slideLayout12.xml><?xml version="1.0" encoding="utf-8"?>
-<p:sldLayout xmlns:a="http://schemas.openxmlformats.org/drawingml/2006/main" xmlns:p="http://schemas.openxmlformats.org/presentationml/2006/main" xmlns:r="http://schemas.openxmlformats.org/officeDocument/2006/relationships" xmlns:p14="http://schemas.microsoft.com/office/powerpoint/2010/main" xmlns:p15="http://schemas.microsoft.com/office/powerpoint/2012/main" xmlns:mc="http://schemas.openxmlformats.org/markup-compatibility/2006" type="blank" preserve="1">
+<p:sldLayout xmlns:a="http://schemas.openxmlformats.org/drawingml/2006/main" xmlns:r="http://schemas.openxmlformats.org/officeDocument/2006/relationships" xmlns:p="http://schemas.openxmlformats.org/presentationml/2006/main" type="blank" preserve="1">
   <p:cSld name="Title, 6 Content">
     <p:spTree>
       <p:nvGrpSpPr>
@@ -405,15 +517,16 @@
           </a:prstGeom>
         </p:spPr>
         <p:txBody>
-          <a:bodyPr lIns="0" rIns="0" tIns="0" bIns="0" anchor="ctr"/>
-          <a:p>
-            <a:endParaRPr b="0" lang="en-US" sz="1800" spc="-1" strike="noStrike">
-              <a:solidFill>
-                <a:srgbClr val="000000"/>
-              </a:solidFill>
-              <a:uFill>
-                <a:solidFill>
-                  <a:srgbClr val="ffffff"/>
+          <a:bodyPr lIns="0" tIns="0" rIns="0" bIns="0" anchor="ctr"/>
+          <a:lstStyle/>
+          <a:p>
+            <a:endParaRPr lang="en-US" sz="1800" b="0" strike="noStrike" spc="-1">
+              <a:solidFill>
+                <a:srgbClr val="000000"/>
+              </a:solidFill>
+              <a:uFill>
+                <a:solidFill>
+                  <a:srgbClr val="FFFFFF"/>
                 </a:solidFill>
               </a:uFill>
               <a:latin typeface="Century Gothic"/>
@@ -441,15 +554,16 @@
           </a:prstGeom>
         </p:spPr>
         <p:txBody>
-          <a:bodyPr lIns="0" rIns="0" tIns="0" bIns="0"/>
-          <a:p>
-            <a:endParaRPr b="0" lang="en-US" sz="1800" spc="-1" strike="noStrike">
-              <a:solidFill>
-                <a:srgbClr val="000000"/>
-              </a:solidFill>
-              <a:uFill>
-                <a:solidFill>
-                  <a:srgbClr val="ffffff"/>
+          <a:bodyPr lIns="0" tIns="0" rIns="0" bIns="0"/>
+          <a:lstStyle/>
+          <a:p>
+            <a:endParaRPr lang="en-US" sz="1800" b="0" strike="noStrike" spc="-1">
+              <a:solidFill>
+                <a:srgbClr val="000000"/>
+              </a:solidFill>
+              <a:uFill>
+                <a:solidFill>
+                  <a:srgbClr val="FFFFFF"/>
                 </a:solidFill>
               </a:uFill>
               <a:latin typeface="Century Gothic"/>
@@ -477,15 +591,16 @@
           </a:prstGeom>
         </p:spPr>
         <p:txBody>
-          <a:bodyPr lIns="0" rIns="0" tIns="0" bIns="0"/>
-          <a:p>
-            <a:endParaRPr b="0" lang="en-US" sz="1800" spc="-1" strike="noStrike">
-              <a:solidFill>
-                <a:srgbClr val="000000"/>
-              </a:solidFill>
-              <a:uFill>
-                <a:solidFill>
-                  <a:srgbClr val="ffffff"/>
+          <a:bodyPr lIns="0" tIns="0" rIns="0" bIns="0"/>
+          <a:lstStyle/>
+          <a:p>
+            <a:endParaRPr lang="en-US" sz="1800" b="0" strike="noStrike" spc="-1">
+              <a:solidFill>
+                <a:srgbClr val="000000"/>
+              </a:solidFill>
+              <a:uFill>
+                <a:solidFill>
+                  <a:srgbClr val="FFFFFF"/>
                 </a:solidFill>
               </a:uFill>
               <a:latin typeface="Century Gothic"/>
@@ -495,7 +610,7 @@
       </p:sp>
       <p:pic>
         <p:nvPicPr>
-          <p:cNvPr id="38" name="" descr=""/>
+          <p:cNvPr id="38" name="Picture 37"/>
           <p:cNvPicPr/>
           <p:nvPr/>
         </p:nvPicPr>
@@ -518,12 +633,12 @@
       </p:pic>
       <p:pic>
         <p:nvPicPr>
-          <p:cNvPr id="39" name="" descr=""/>
+          <p:cNvPr id="39" name="Picture 38"/>
           <p:cNvPicPr/>
           <p:nvPr/>
         </p:nvPicPr>
         <p:blipFill>
-          <a:blip r:embed="rId3"/>
+          <a:blip r:embed="rId2"/>
           <a:stretch/>
         </p:blipFill>
         <p:spPr>
@@ -541,11 +656,14 @@
       </p:pic>
     </p:spTree>
   </p:cSld>
+  <p:clrMapOvr>
+    <a:masterClrMapping/>
+  </p:clrMapOvr>
 </p:sldLayout>
 </file>
 
 <file path=ppt/slideLayouts/slideLayout2.xml><?xml version="1.0" encoding="utf-8"?>
-<p:sldLayout xmlns:a="http://schemas.openxmlformats.org/drawingml/2006/main" xmlns:p="http://schemas.openxmlformats.org/presentationml/2006/main" xmlns:r="http://schemas.openxmlformats.org/officeDocument/2006/relationships" xmlns:p14="http://schemas.microsoft.com/office/powerpoint/2010/main" xmlns:p15="http://schemas.microsoft.com/office/powerpoint/2012/main" xmlns:mc="http://schemas.openxmlformats.org/markup-compatibility/2006" type="tx" preserve="1">
+<p:sldLayout xmlns:a="http://schemas.openxmlformats.org/drawingml/2006/main" xmlns:r="http://schemas.openxmlformats.org/officeDocument/2006/relationships" xmlns:p="http://schemas.openxmlformats.org/presentationml/2006/main" type="tx" preserve="1">
   <p:cSld name="Title Slide">
     <p:spTree>
       <p:nvGrpSpPr>
@@ -581,15 +699,16 @@
           </a:prstGeom>
         </p:spPr>
         <p:txBody>
-          <a:bodyPr lIns="0" rIns="0" tIns="0" bIns="0" anchor="ctr"/>
-          <a:p>
-            <a:endParaRPr b="0" lang="en-US" sz="1800" spc="-1" strike="noStrike">
-              <a:solidFill>
-                <a:srgbClr val="000000"/>
-              </a:solidFill>
-              <a:uFill>
-                <a:solidFill>
-                  <a:srgbClr val="ffffff"/>
+          <a:bodyPr lIns="0" tIns="0" rIns="0" bIns="0" anchor="ctr"/>
+          <a:lstStyle/>
+          <a:p>
+            <a:endParaRPr lang="en-US" sz="1800" b="0" strike="noStrike" spc="-1">
+              <a:solidFill>
+                <a:srgbClr val="000000"/>
+              </a:solidFill>
+              <a:uFill>
+                <a:solidFill>
+                  <a:srgbClr val="FFFFFF"/>
                 </a:solidFill>
               </a:uFill>
               <a:latin typeface="Century Gothic"/>
@@ -617,16 +736,17 @@
           </a:prstGeom>
         </p:spPr>
         <p:txBody>
-          <a:bodyPr lIns="0" rIns="0" tIns="0" bIns="0" anchor="ctr"/>
+          <a:bodyPr lIns="0" tIns="0" rIns="0" bIns="0" anchor="ctr"/>
+          <a:lstStyle/>
           <a:p>
             <a:pPr algn="ctr"/>
-            <a:endParaRPr b="0" lang="en-US" sz="3200" spc="-1" strike="noStrike">
-              <a:solidFill>
-                <a:srgbClr val="000000"/>
-              </a:solidFill>
-              <a:uFill>
-                <a:solidFill>
-                  <a:srgbClr val="ffffff"/>
+            <a:endParaRPr lang="en-US" sz="3200" b="0" strike="noStrike" spc="-1">
+              <a:solidFill>
+                <a:srgbClr val="000000"/>
+              </a:solidFill>
+              <a:uFill>
+                <a:solidFill>
+                  <a:srgbClr val="FFFFFF"/>
                 </a:solidFill>
               </a:uFill>
               <a:latin typeface="Arial"/>
@@ -636,11 +756,14 @@
       </p:sp>
     </p:spTree>
   </p:cSld>
+  <p:clrMapOvr>
+    <a:masterClrMapping/>
+  </p:clrMapOvr>
 </p:sldLayout>
 </file>
 
 <file path=ppt/slideLayouts/slideLayout3.xml><?xml version="1.0" encoding="utf-8"?>
-<p:sldLayout xmlns:a="http://schemas.openxmlformats.org/drawingml/2006/main" xmlns:p="http://schemas.openxmlformats.org/presentationml/2006/main" xmlns:r="http://schemas.openxmlformats.org/officeDocument/2006/relationships" xmlns:p14="http://schemas.microsoft.com/office/powerpoint/2010/main" xmlns:p15="http://schemas.microsoft.com/office/powerpoint/2012/main" xmlns:mc="http://schemas.openxmlformats.org/markup-compatibility/2006" type="obj" preserve="1">
+<p:sldLayout xmlns:a="http://schemas.openxmlformats.org/drawingml/2006/main" xmlns:r="http://schemas.openxmlformats.org/officeDocument/2006/relationships" xmlns:p="http://schemas.openxmlformats.org/presentationml/2006/main" type="obj" preserve="1">
   <p:cSld name="Title, Content">
     <p:spTree>
       <p:nvGrpSpPr>
@@ -676,15 +799,16 @@
           </a:prstGeom>
         </p:spPr>
         <p:txBody>
-          <a:bodyPr lIns="0" rIns="0" tIns="0" bIns="0" anchor="ctr"/>
-          <a:p>
-            <a:endParaRPr b="0" lang="en-US" sz="1800" spc="-1" strike="noStrike">
-              <a:solidFill>
-                <a:srgbClr val="000000"/>
-              </a:solidFill>
-              <a:uFill>
-                <a:solidFill>
-                  <a:srgbClr val="ffffff"/>
+          <a:bodyPr lIns="0" tIns="0" rIns="0" bIns="0" anchor="ctr"/>
+          <a:lstStyle/>
+          <a:p>
+            <a:endParaRPr lang="en-US" sz="1800" b="0" strike="noStrike" spc="-1">
+              <a:solidFill>
+                <a:srgbClr val="000000"/>
+              </a:solidFill>
+              <a:uFill>
+                <a:solidFill>
+                  <a:srgbClr val="FFFFFF"/>
                 </a:solidFill>
               </a:uFill>
               <a:latin typeface="Century Gothic"/>
@@ -712,15 +836,16 @@
           </a:prstGeom>
         </p:spPr>
         <p:txBody>
-          <a:bodyPr lIns="0" rIns="0" tIns="0" bIns="0"/>
-          <a:p>
-            <a:endParaRPr b="0" lang="en-US" sz="1800" spc="-1" strike="noStrike">
-              <a:solidFill>
-                <a:srgbClr val="000000"/>
-              </a:solidFill>
-              <a:uFill>
-                <a:solidFill>
-                  <a:srgbClr val="ffffff"/>
+          <a:bodyPr lIns="0" tIns="0" rIns="0" bIns="0"/>
+          <a:lstStyle/>
+          <a:p>
+            <a:endParaRPr lang="en-US" sz="1800" b="0" strike="noStrike" spc="-1">
+              <a:solidFill>
+                <a:srgbClr val="000000"/>
+              </a:solidFill>
+              <a:uFill>
+                <a:solidFill>
+                  <a:srgbClr val="FFFFFF"/>
                 </a:solidFill>
               </a:uFill>
               <a:latin typeface="Century Gothic"/>
@@ -730,11 +855,14 @@
       </p:sp>
     </p:spTree>
   </p:cSld>
+  <p:clrMapOvr>
+    <a:masterClrMapping/>
+  </p:clrMapOvr>
 </p:sldLayout>
 </file>
 
 <file path=ppt/slideLayouts/slideLayout4.xml><?xml version="1.0" encoding="utf-8"?>
-<p:sldLayout xmlns:a="http://schemas.openxmlformats.org/drawingml/2006/main" xmlns:p="http://schemas.openxmlformats.org/presentationml/2006/main" xmlns:r="http://schemas.openxmlformats.org/officeDocument/2006/relationships" xmlns:p14="http://schemas.microsoft.com/office/powerpoint/2010/main" xmlns:p15="http://schemas.microsoft.com/office/powerpoint/2012/main" xmlns:mc="http://schemas.openxmlformats.org/markup-compatibility/2006" type="twoObj" preserve="1">
+<p:sldLayout xmlns:a="http://schemas.openxmlformats.org/drawingml/2006/main" xmlns:r="http://schemas.openxmlformats.org/officeDocument/2006/relationships" xmlns:p="http://schemas.openxmlformats.org/presentationml/2006/main" type="twoObj" preserve="1">
   <p:cSld name="Title, 2 Content">
     <p:spTree>
       <p:nvGrpSpPr>
@@ -770,15 +898,16 @@
           </a:prstGeom>
         </p:spPr>
         <p:txBody>
-          <a:bodyPr lIns="0" rIns="0" tIns="0" bIns="0" anchor="ctr"/>
-          <a:p>
-            <a:endParaRPr b="0" lang="en-US" sz="1800" spc="-1" strike="noStrike">
-              <a:solidFill>
-                <a:srgbClr val="000000"/>
-              </a:solidFill>
-              <a:uFill>
-                <a:solidFill>
-                  <a:srgbClr val="ffffff"/>
+          <a:bodyPr lIns="0" tIns="0" rIns="0" bIns="0" anchor="ctr"/>
+          <a:lstStyle/>
+          <a:p>
+            <a:endParaRPr lang="en-US" sz="1800" b="0" strike="noStrike" spc="-1">
+              <a:solidFill>
+                <a:srgbClr val="000000"/>
+              </a:solidFill>
+              <a:uFill>
+                <a:solidFill>
+                  <a:srgbClr val="FFFFFF"/>
                 </a:solidFill>
               </a:uFill>
               <a:latin typeface="Century Gothic"/>
@@ -806,15 +935,16 @@
           </a:prstGeom>
         </p:spPr>
         <p:txBody>
-          <a:bodyPr lIns="0" rIns="0" tIns="0" bIns="0"/>
-          <a:p>
-            <a:endParaRPr b="0" lang="en-US" sz="1800" spc="-1" strike="noStrike">
-              <a:solidFill>
-                <a:srgbClr val="000000"/>
-              </a:solidFill>
-              <a:uFill>
-                <a:solidFill>
-                  <a:srgbClr val="ffffff"/>
+          <a:bodyPr lIns="0" tIns="0" rIns="0" bIns="0"/>
+          <a:lstStyle/>
+          <a:p>
+            <a:endParaRPr lang="en-US" sz="1800" b="0" strike="noStrike" spc="-1">
+              <a:solidFill>
+                <a:srgbClr val="000000"/>
+              </a:solidFill>
+              <a:uFill>
+                <a:solidFill>
+                  <a:srgbClr val="FFFFFF"/>
                 </a:solidFill>
               </a:uFill>
               <a:latin typeface="Century Gothic"/>
@@ -842,15 +972,16 @@
           </a:prstGeom>
         </p:spPr>
         <p:txBody>
-          <a:bodyPr lIns="0" rIns="0" tIns="0" bIns="0"/>
-          <a:p>
-            <a:endParaRPr b="0" lang="en-US" sz="1800" spc="-1" strike="noStrike">
-              <a:solidFill>
-                <a:srgbClr val="000000"/>
-              </a:solidFill>
-              <a:uFill>
-                <a:solidFill>
-                  <a:srgbClr val="ffffff"/>
+          <a:bodyPr lIns="0" tIns="0" rIns="0" bIns="0"/>
+          <a:lstStyle/>
+          <a:p>
+            <a:endParaRPr lang="en-US" sz="1800" b="0" strike="noStrike" spc="-1">
+              <a:solidFill>
+                <a:srgbClr val="000000"/>
+              </a:solidFill>
+              <a:uFill>
+                <a:solidFill>
+                  <a:srgbClr val="FFFFFF"/>
                 </a:solidFill>
               </a:uFill>
               <a:latin typeface="Century Gothic"/>
@@ -860,11 +991,14 @@
       </p:sp>
     </p:spTree>
   </p:cSld>
+  <p:clrMapOvr>
+    <a:masterClrMapping/>
+  </p:clrMapOvr>
 </p:sldLayout>
 </file>
 
 <file path=ppt/slideLayouts/slideLayout5.xml><?xml version="1.0" encoding="utf-8"?>
-<p:sldLayout xmlns:a="http://schemas.openxmlformats.org/drawingml/2006/main" xmlns:p="http://schemas.openxmlformats.org/presentationml/2006/main" xmlns:r="http://schemas.openxmlformats.org/officeDocument/2006/relationships" xmlns:p14="http://schemas.microsoft.com/office/powerpoint/2010/main" xmlns:p15="http://schemas.microsoft.com/office/powerpoint/2012/main" xmlns:mc="http://schemas.openxmlformats.org/markup-compatibility/2006" type="titleOnly" preserve="1">
+<p:sldLayout xmlns:a="http://schemas.openxmlformats.org/drawingml/2006/main" xmlns:r="http://schemas.openxmlformats.org/officeDocument/2006/relationships" xmlns:p="http://schemas.openxmlformats.org/presentationml/2006/main" type="titleOnly" preserve="1">
   <p:cSld name="Title Only">
     <p:spTree>
       <p:nvGrpSpPr>
@@ -900,15 +1034,16 @@
           </a:prstGeom>
         </p:spPr>
         <p:txBody>
-          <a:bodyPr lIns="0" rIns="0" tIns="0" bIns="0" anchor="ctr"/>
-          <a:p>
-            <a:endParaRPr b="0" lang="en-US" sz="1800" spc="-1" strike="noStrike">
-              <a:solidFill>
-                <a:srgbClr val="000000"/>
-              </a:solidFill>
-              <a:uFill>
-                <a:solidFill>
-                  <a:srgbClr val="ffffff"/>
+          <a:bodyPr lIns="0" tIns="0" rIns="0" bIns="0" anchor="ctr"/>
+          <a:lstStyle/>
+          <a:p>
+            <a:endParaRPr lang="en-US" sz="1800" b="0" strike="noStrike" spc="-1">
+              <a:solidFill>
+                <a:srgbClr val="000000"/>
+              </a:solidFill>
+              <a:uFill>
+                <a:solidFill>
+                  <a:srgbClr val="FFFFFF"/>
                 </a:solidFill>
               </a:uFill>
               <a:latin typeface="Century Gothic"/>
@@ -918,11 +1053,14 @@
       </p:sp>
     </p:spTree>
   </p:cSld>
+  <p:clrMapOvr>
+    <a:masterClrMapping/>
+  </p:clrMapOvr>
 </p:sldLayout>
 </file>
 
 <file path=ppt/slideLayouts/slideLayout6.xml><?xml version="1.0" encoding="utf-8"?>
-<p:sldLayout xmlns:a="http://schemas.openxmlformats.org/drawingml/2006/main" xmlns:p="http://schemas.openxmlformats.org/presentationml/2006/main" xmlns:r="http://schemas.openxmlformats.org/officeDocument/2006/relationships" xmlns:p14="http://schemas.microsoft.com/office/powerpoint/2010/main" xmlns:p15="http://schemas.microsoft.com/office/powerpoint/2012/main" xmlns:mc="http://schemas.openxmlformats.org/markup-compatibility/2006" type="objOnly" preserve="1">
+<p:sldLayout xmlns:a="http://schemas.openxmlformats.org/drawingml/2006/main" xmlns:r="http://schemas.openxmlformats.org/officeDocument/2006/relationships" xmlns:p="http://schemas.openxmlformats.org/presentationml/2006/main" type="objOnly" preserve="1">
   <p:cSld name="Centered Text">
     <p:spTree>
       <p:nvGrpSpPr>
@@ -958,16 +1096,17 @@
           </a:prstGeom>
         </p:spPr>
         <p:txBody>
-          <a:bodyPr lIns="0" rIns="0" tIns="0" bIns="0" anchor="ctr"/>
+          <a:bodyPr lIns="0" tIns="0" rIns="0" bIns="0" anchor="ctr"/>
+          <a:lstStyle/>
           <a:p>
             <a:pPr algn="ctr"/>
-            <a:endParaRPr b="0" lang="en-US" sz="3200" spc="-1" strike="noStrike">
-              <a:solidFill>
-                <a:srgbClr val="000000"/>
-              </a:solidFill>
-              <a:uFill>
-                <a:solidFill>
-                  <a:srgbClr val="ffffff"/>
+            <a:endParaRPr lang="en-US" sz="3200" b="0" strike="noStrike" spc="-1">
+              <a:solidFill>
+                <a:srgbClr val="000000"/>
+              </a:solidFill>
+              <a:uFill>
+                <a:solidFill>
+                  <a:srgbClr val="FFFFFF"/>
                 </a:solidFill>
               </a:uFill>
               <a:latin typeface="Arial"/>
@@ -977,11 +1116,14 @@
       </p:sp>
     </p:spTree>
   </p:cSld>
+  <p:clrMapOvr>
+    <a:masterClrMapping/>
+  </p:clrMapOvr>
 </p:sldLayout>
 </file>
 
 <file path=ppt/slideLayouts/slideLayout7.xml><?xml version="1.0" encoding="utf-8"?>
-<p:sldLayout xmlns:a="http://schemas.openxmlformats.org/drawingml/2006/main" xmlns:p="http://schemas.openxmlformats.org/presentationml/2006/main" xmlns:r="http://schemas.openxmlformats.org/officeDocument/2006/relationships" xmlns:p14="http://schemas.microsoft.com/office/powerpoint/2010/main" xmlns:p15="http://schemas.microsoft.com/office/powerpoint/2012/main" xmlns:mc="http://schemas.openxmlformats.org/markup-compatibility/2006" type="twoObjAndObj" preserve="1">
+<p:sldLayout xmlns:a="http://schemas.openxmlformats.org/drawingml/2006/main" xmlns:r="http://schemas.openxmlformats.org/officeDocument/2006/relationships" xmlns:p="http://schemas.openxmlformats.org/presentationml/2006/main" type="twoObjAndObj" preserve="1">
   <p:cSld name="Title, 2 Content and Content">
     <p:spTree>
       <p:nvGrpSpPr>
@@ -1017,15 +1159,16 @@
           </a:prstGeom>
         </p:spPr>
         <p:txBody>
-          <a:bodyPr lIns="0" rIns="0" tIns="0" bIns="0" anchor="ctr"/>
-          <a:p>
-            <a:endParaRPr b="0" lang="en-US" sz="1800" spc="-1" strike="noStrike">
-              <a:solidFill>
-                <a:srgbClr val="000000"/>
-              </a:solidFill>
-              <a:uFill>
-                <a:solidFill>
-                  <a:srgbClr val="ffffff"/>
+          <a:bodyPr lIns="0" tIns="0" rIns="0" bIns="0" anchor="ctr"/>
+          <a:lstStyle/>
+          <a:p>
+            <a:endParaRPr lang="en-US" sz="1800" b="0" strike="noStrike" spc="-1">
+              <a:solidFill>
+                <a:srgbClr val="000000"/>
+              </a:solidFill>
+              <a:uFill>
+                <a:solidFill>
+                  <a:srgbClr val="FFFFFF"/>
                 </a:solidFill>
               </a:uFill>
               <a:latin typeface="Century Gothic"/>
@@ -1053,15 +1196,16 @@
           </a:prstGeom>
         </p:spPr>
         <p:txBody>
-          <a:bodyPr lIns="0" rIns="0" tIns="0" bIns="0"/>
-          <a:p>
-            <a:endParaRPr b="0" lang="en-US" sz="1800" spc="-1" strike="noStrike">
-              <a:solidFill>
-                <a:srgbClr val="000000"/>
-              </a:solidFill>
-              <a:uFill>
-                <a:solidFill>
-                  <a:srgbClr val="ffffff"/>
+          <a:bodyPr lIns="0" tIns="0" rIns="0" bIns="0"/>
+          <a:lstStyle/>
+          <a:p>
+            <a:endParaRPr lang="en-US" sz="1800" b="0" strike="noStrike" spc="-1">
+              <a:solidFill>
+                <a:srgbClr val="000000"/>
+              </a:solidFill>
+              <a:uFill>
+                <a:solidFill>
+                  <a:srgbClr val="FFFFFF"/>
                 </a:solidFill>
               </a:uFill>
               <a:latin typeface="Century Gothic"/>
@@ -1089,15 +1233,16 @@
           </a:prstGeom>
         </p:spPr>
         <p:txBody>
-          <a:bodyPr lIns="0" rIns="0" tIns="0" bIns="0"/>
-          <a:p>
-            <a:endParaRPr b="0" lang="en-US" sz="1800" spc="-1" strike="noStrike">
-              <a:solidFill>
-                <a:srgbClr val="000000"/>
-              </a:solidFill>
-              <a:uFill>
-                <a:solidFill>
-                  <a:srgbClr val="ffffff"/>
+          <a:bodyPr lIns="0" tIns="0" rIns="0" bIns="0"/>
+          <a:lstStyle/>
+          <a:p>
+            <a:endParaRPr lang="en-US" sz="1800" b="0" strike="noStrike" spc="-1">
+              <a:solidFill>
+                <a:srgbClr val="000000"/>
+              </a:solidFill>
+              <a:uFill>
+                <a:solidFill>
+                  <a:srgbClr val="FFFFFF"/>
                 </a:solidFill>
               </a:uFill>
               <a:latin typeface="Century Gothic"/>
@@ -1125,15 +1270,16 @@
           </a:prstGeom>
         </p:spPr>
         <p:txBody>
-          <a:bodyPr lIns="0" rIns="0" tIns="0" bIns="0"/>
-          <a:p>
-            <a:endParaRPr b="0" lang="en-US" sz="1800" spc="-1" strike="noStrike">
-              <a:solidFill>
-                <a:srgbClr val="000000"/>
-              </a:solidFill>
-              <a:uFill>
-                <a:solidFill>
-                  <a:srgbClr val="ffffff"/>
+          <a:bodyPr lIns="0" tIns="0" rIns="0" bIns="0"/>
+          <a:lstStyle/>
+          <a:p>
+            <a:endParaRPr lang="en-US" sz="1800" b="0" strike="noStrike" spc="-1">
+              <a:solidFill>
+                <a:srgbClr val="000000"/>
+              </a:solidFill>
+              <a:uFill>
+                <a:solidFill>
+                  <a:srgbClr val="FFFFFF"/>
                 </a:solidFill>
               </a:uFill>
               <a:latin typeface="Century Gothic"/>
@@ -1143,11 +1289,14 @@
       </p:sp>
     </p:spTree>
   </p:cSld>
+  <p:clrMapOvr>
+    <a:masterClrMapping/>
+  </p:clrMapOvr>
 </p:sldLayout>
 </file>
 
 <file path=ppt/slideLayouts/slideLayout8.xml><?xml version="1.0" encoding="utf-8"?>
-<p:sldLayout xmlns:a="http://schemas.openxmlformats.org/drawingml/2006/main" xmlns:p="http://schemas.openxmlformats.org/presentationml/2006/main" xmlns:r="http://schemas.openxmlformats.org/officeDocument/2006/relationships" xmlns:p14="http://schemas.microsoft.com/office/powerpoint/2010/main" xmlns:p15="http://schemas.microsoft.com/office/powerpoint/2012/main" xmlns:mc="http://schemas.openxmlformats.org/markup-compatibility/2006" type="objAndTwoObj" preserve="1">
+<p:sldLayout xmlns:a="http://schemas.openxmlformats.org/drawingml/2006/main" xmlns:r="http://schemas.openxmlformats.org/officeDocument/2006/relationships" xmlns:p="http://schemas.openxmlformats.org/presentationml/2006/main" type="objAndTwoObj" preserve="1">
   <p:cSld name="Title Content and 2 Content">
     <p:spTree>
       <p:nvGrpSpPr>
@@ -1183,15 +1332,16 @@
           </a:prstGeom>
         </p:spPr>
         <p:txBody>
-          <a:bodyPr lIns="0" rIns="0" tIns="0" bIns="0" anchor="ctr"/>
-          <a:p>
-            <a:endParaRPr b="0" lang="en-US" sz="1800" spc="-1" strike="noStrike">
-              <a:solidFill>
-                <a:srgbClr val="000000"/>
-              </a:solidFill>
-              <a:uFill>
-                <a:solidFill>
-                  <a:srgbClr val="ffffff"/>
+          <a:bodyPr lIns="0" tIns="0" rIns="0" bIns="0" anchor="ctr"/>
+          <a:lstStyle/>
+          <a:p>
+            <a:endParaRPr lang="en-US" sz="1800" b="0" strike="noStrike" spc="-1">
+              <a:solidFill>
+                <a:srgbClr val="000000"/>
+              </a:solidFill>
+              <a:uFill>
+                <a:solidFill>
+                  <a:srgbClr val="FFFFFF"/>
                 </a:solidFill>
               </a:uFill>
               <a:latin typeface="Century Gothic"/>
@@ -1219,15 +1369,16 @@
           </a:prstGeom>
         </p:spPr>
         <p:txBody>
-          <a:bodyPr lIns="0" rIns="0" tIns="0" bIns="0"/>
-          <a:p>
-            <a:endParaRPr b="0" lang="en-US" sz="1800" spc="-1" strike="noStrike">
-              <a:solidFill>
-                <a:srgbClr val="000000"/>
-              </a:solidFill>
-              <a:uFill>
-                <a:solidFill>
-                  <a:srgbClr val="ffffff"/>
+          <a:bodyPr lIns="0" tIns="0" rIns="0" bIns="0"/>
+          <a:lstStyle/>
+          <a:p>
+            <a:endParaRPr lang="en-US" sz="1800" b="0" strike="noStrike" spc="-1">
+              <a:solidFill>
+                <a:srgbClr val="000000"/>
+              </a:solidFill>
+              <a:uFill>
+                <a:solidFill>
+                  <a:srgbClr val="FFFFFF"/>
                 </a:solidFill>
               </a:uFill>
               <a:latin typeface="Century Gothic"/>
@@ -1255,15 +1406,16 @@
           </a:prstGeom>
         </p:spPr>
         <p:txBody>
-          <a:bodyPr lIns="0" rIns="0" tIns="0" bIns="0"/>
-          <a:p>
-            <a:endParaRPr b="0" lang="en-US" sz="1800" spc="-1" strike="noStrike">
-              <a:solidFill>
-                <a:srgbClr val="000000"/>
-              </a:solidFill>
-              <a:uFill>
-                <a:solidFill>
-                  <a:srgbClr val="ffffff"/>
+          <a:bodyPr lIns="0" tIns="0" rIns="0" bIns="0"/>
+          <a:lstStyle/>
+          <a:p>
+            <a:endParaRPr lang="en-US" sz="1800" b="0" strike="noStrike" spc="-1">
+              <a:solidFill>
+                <a:srgbClr val="000000"/>
+              </a:solidFill>
+              <a:uFill>
+                <a:solidFill>
+                  <a:srgbClr val="FFFFFF"/>
                 </a:solidFill>
               </a:uFill>
               <a:latin typeface="Century Gothic"/>
@@ -1291,15 +1443,16 @@
           </a:prstGeom>
         </p:spPr>
         <p:txBody>
-          <a:bodyPr lIns="0" rIns="0" tIns="0" bIns="0"/>
-          <a:p>
-            <a:endParaRPr b="0" lang="en-US" sz="1800" spc="-1" strike="noStrike">
-              <a:solidFill>
-                <a:srgbClr val="000000"/>
-              </a:solidFill>
-              <a:uFill>
-                <a:solidFill>
-                  <a:srgbClr val="ffffff"/>
+          <a:bodyPr lIns="0" tIns="0" rIns="0" bIns="0"/>
+          <a:lstStyle/>
+          <a:p>
+            <a:endParaRPr lang="en-US" sz="1800" b="0" strike="noStrike" spc="-1">
+              <a:solidFill>
+                <a:srgbClr val="000000"/>
+              </a:solidFill>
+              <a:uFill>
+                <a:solidFill>
+                  <a:srgbClr val="FFFFFF"/>
                 </a:solidFill>
               </a:uFill>
               <a:latin typeface="Century Gothic"/>
@@ -1309,11 +1462,14 @@
       </p:sp>
     </p:spTree>
   </p:cSld>
+  <p:clrMapOvr>
+    <a:masterClrMapping/>
+  </p:clrMapOvr>
 </p:sldLayout>
 </file>
 
 <file path=ppt/slideLayouts/slideLayout9.xml><?xml version="1.0" encoding="utf-8"?>
-<p:sldLayout xmlns:a="http://schemas.openxmlformats.org/drawingml/2006/main" xmlns:p="http://schemas.openxmlformats.org/presentationml/2006/main" xmlns:r="http://schemas.openxmlformats.org/officeDocument/2006/relationships" xmlns:p14="http://schemas.microsoft.com/office/powerpoint/2010/main" xmlns:p15="http://schemas.microsoft.com/office/powerpoint/2012/main" xmlns:mc="http://schemas.openxmlformats.org/markup-compatibility/2006" type="twoObjOverTx" preserve="1">
+<p:sldLayout xmlns:a="http://schemas.openxmlformats.org/drawingml/2006/main" xmlns:r="http://schemas.openxmlformats.org/officeDocument/2006/relationships" xmlns:p="http://schemas.openxmlformats.org/presentationml/2006/main" type="twoObjOverTx" preserve="1">
   <p:cSld name="Title, 2 Content over Content">
     <p:spTree>
       <p:nvGrpSpPr>
@@ -1349,15 +1505,16 @@
           </a:prstGeom>
         </p:spPr>
         <p:txBody>
-          <a:bodyPr lIns="0" rIns="0" tIns="0" bIns="0" anchor="ctr"/>
-          <a:p>
-            <a:endParaRPr b="0" lang="en-US" sz="1800" spc="-1" strike="noStrike">
-              <a:solidFill>
-                <a:srgbClr val="000000"/>
-              </a:solidFill>
-              <a:uFill>
-                <a:solidFill>
-                  <a:srgbClr val="ffffff"/>
+          <a:bodyPr lIns="0" tIns="0" rIns="0" bIns="0" anchor="ctr"/>
+          <a:lstStyle/>
+          <a:p>
+            <a:endParaRPr lang="en-US" sz="1800" b="0" strike="noStrike" spc="-1">
+              <a:solidFill>
+                <a:srgbClr val="000000"/>
+              </a:solidFill>
+              <a:uFill>
+                <a:solidFill>
+                  <a:srgbClr val="FFFFFF"/>
                 </a:solidFill>
               </a:uFill>
               <a:latin typeface="Century Gothic"/>
@@ -1385,15 +1542,16 @@
           </a:prstGeom>
         </p:spPr>
         <p:txBody>
-          <a:bodyPr lIns="0" rIns="0" tIns="0" bIns="0"/>
-          <a:p>
-            <a:endParaRPr b="0" lang="en-US" sz="1800" spc="-1" strike="noStrike">
-              <a:solidFill>
-                <a:srgbClr val="000000"/>
-              </a:solidFill>
-              <a:uFill>
-                <a:solidFill>
-                  <a:srgbClr val="ffffff"/>
+          <a:bodyPr lIns="0" tIns="0" rIns="0" bIns="0"/>
+          <a:lstStyle/>
+          <a:p>
+            <a:endParaRPr lang="en-US" sz="1800" b="0" strike="noStrike" spc="-1">
+              <a:solidFill>
+                <a:srgbClr val="000000"/>
+              </a:solidFill>
+              <a:uFill>
+                <a:solidFill>
+                  <a:srgbClr val="FFFFFF"/>
                 </a:solidFill>
               </a:uFill>
               <a:latin typeface="Century Gothic"/>
@@ -1421,15 +1579,16 @@
           </a:prstGeom>
         </p:spPr>
         <p:txBody>
-          <a:bodyPr lIns="0" rIns="0" tIns="0" bIns="0"/>
-          <a:p>
-            <a:endParaRPr b="0" lang="en-US" sz="1800" spc="-1" strike="noStrike">
-              <a:solidFill>
-                <a:srgbClr val="000000"/>
-              </a:solidFill>
-              <a:uFill>
-                <a:solidFill>
-                  <a:srgbClr val="ffffff"/>
+          <a:bodyPr lIns="0" tIns="0" rIns="0" bIns="0"/>
+          <a:lstStyle/>
+          <a:p>
+            <a:endParaRPr lang="en-US" sz="1800" b="0" strike="noStrike" spc="-1">
+              <a:solidFill>
+                <a:srgbClr val="000000"/>
+              </a:solidFill>
+              <a:uFill>
+                <a:solidFill>
+                  <a:srgbClr val="FFFFFF"/>
                 </a:solidFill>
               </a:uFill>
               <a:latin typeface="Century Gothic"/>
@@ -1457,15 +1616,16 @@
           </a:prstGeom>
         </p:spPr>
         <p:txBody>
-          <a:bodyPr lIns="0" rIns="0" tIns="0" bIns="0"/>
-          <a:p>
-            <a:endParaRPr b="0" lang="en-US" sz="1800" spc="-1" strike="noStrike">
-              <a:solidFill>
-                <a:srgbClr val="000000"/>
-              </a:solidFill>
-              <a:uFill>
-                <a:solidFill>
-                  <a:srgbClr val="ffffff"/>
+          <a:bodyPr lIns="0" tIns="0" rIns="0" bIns="0"/>
+          <a:lstStyle/>
+          <a:p>
+            <a:endParaRPr lang="en-US" sz="1800" b="0" strike="noStrike" spc="-1">
+              <a:solidFill>
+                <a:srgbClr val="000000"/>
+              </a:solidFill>
+              <a:uFill>
+                <a:solidFill>
+                  <a:srgbClr val="FFFFFF"/>
                 </a:solidFill>
               </a:uFill>
               <a:latin typeface="Century Gothic"/>
@@ -1475,17 +1635,21 @@
       </p:sp>
     </p:spTree>
   </p:cSld>
+  <p:clrMapOvr>
+    <a:masterClrMapping/>
+  </p:clrMapOvr>
 </p:sldLayout>
 </file>
 
 <file path=ppt/slideMasters/slideMaster1.xml><?xml version="1.0" encoding="utf-8"?>
-<p:sldMaster xmlns:a="http://schemas.openxmlformats.org/drawingml/2006/main" xmlns:p="http://schemas.openxmlformats.org/presentationml/2006/main" xmlns:r="http://schemas.openxmlformats.org/officeDocument/2006/relationships" xmlns:p14="http://schemas.microsoft.com/office/powerpoint/2010/main" xmlns:p15="http://schemas.microsoft.com/office/powerpoint/2012/main" xmlns:mc="http://schemas.openxmlformats.org/markup-compatibility/2006">
+<p:sldMaster xmlns:a="http://schemas.openxmlformats.org/drawingml/2006/main" xmlns:r="http://schemas.openxmlformats.org/officeDocument/2006/relationships" xmlns:p="http://schemas.openxmlformats.org/presentationml/2006/main">
   <p:cSld>
     <p:bg>
       <p:bgPr>
         <a:solidFill>
-          <a:srgbClr val="ffffff"/>
+          <a:srgbClr val="FFFFFF"/>
         </a:solidFill>
+        <a:effectLst/>
       </p:bgPr>
     </p:bg>
     <p:spTree>
@@ -1504,7 +1668,7 @@
       </p:grpSpPr>
       <p:sp>
         <p:nvSpPr>
-          <p:cNvPr id="0" name="CustomShape 1"/>
+          <p:cNvPr id="6" name="CustomShape 1"/>
           <p:cNvSpPr/>
           <p:nvPr/>
         </p:nvSpPr>
@@ -1527,15 +1691,21 @@
           </a:effectLst>
         </p:spPr>
         <p:style>
-          <a:lnRef idx="0"/>
-          <a:fillRef idx="0"/>
-          <a:effectRef idx="0"/>
+          <a:lnRef idx="0">
+            <a:scrgbClr r="0" g="0" b="0"/>
+          </a:lnRef>
+          <a:fillRef idx="0">
+            <a:scrgbClr r="0" g="0" b="0"/>
+          </a:fillRef>
+          <a:effectRef idx="0">
+            <a:scrgbClr r="0" g="0" b="0"/>
+          </a:effectRef>
           <a:fontRef idx="minor"/>
         </p:style>
       </p:sp>
       <p:sp>
         <p:nvSpPr>
-          <p:cNvPr id="1" name="PlaceHolder 2"/>
+          <p:cNvPr id="7" name="PlaceHolder 2"/>
           <p:cNvSpPr>
             <a:spLocks noGrp="1"/>
           </p:cNvSpPr>
@@ -1554,6 +1724,7 @@
         </p:spPr>
         <p:txBody>
           <a:bodyPr anchor="ctr"/>
+          <a:lstStyle/>
           <a:p>
             <a:pPr>
               <a:lnSpc>
@@ -1561,40 +1732,26 @@
               </a:lnSpc>
             </a:pPr>
             <a:r>
-              <a:rPr b="0" lang="en-US" sz="4800" spc="-1" strike="noStrike">
+              <a:rPr lang="en-US" sz="4800" b="0" strike="noStrike" spc="-1">
                 <a:solidFill>
                   <a:srgbClr val="262626"/>
                 </a:solidFill>
                 <a:uFill>
                   <a:solidFill>
-                    <a:srgbClr val="ffffff"/>
-                  </a:solidFill>
-                </a:uFill>
-                <a:latin typeface="Century Gothic"/>
-              </a:rPr>
-              <a:t>Click to edit Master title </a:t>
-            </a:r>
-            <a:r>
-              <a:rPr b="0" lang="en-US" sz="4800" spc="-1" strike="noStrike">
-                <a:solidFill>
-                  <a:srgbClr val="262626"/>
-                </a:solidFill>
-                <a:uFill>
-                  <a:solidFill>
-                    <a:srgbClr val="ffffff"/>
-                  </a:solidFill>
-                </a:uFill>
-                <a:latin typeface="Century Gothic"/>
-              </a:rPr>
-              <a:t>style</a:t>
-            </a:r>
-            <a:endParaRPr b="0" lang="en-US" sz="1800" spc="-1" strike="noStrike">
-              <a:solidFill>
-                <a:srgbClr val="000000"/>
-              </a:solidFill>
-              <a:uFill>
-                <a:solidFill>
-                  <a:srgbClr val="ffffff"/>
+                    <a:srgbClr val="FFFFFF"/>
+                  </a:solidFill>
+                </a:uFill>
+                <a:latin typeface="Century Gothic"/>
+              </a:rPr>
+              <a:t>Click to edit Master title style</a:t>
+            </a:r>
+            <a:endParaRPr lang="en-US" sz="1800" b="0" strike="noStrike" spc="-1">
+              <a:solidFill>
+                <a:srgbClr val="000000"/>
+              </a:solidFill>
+              <a:uFill>
+                <a:solidFill>
+                  <a:srgbClr val="FFFFFF"/>
                 </a:solidFill>
               </a:uFill>
               <a:latin typeface="Century Gothic"/>
@@ -1623,6 +1780,7 @@
         </p:spPr>
         <p:txBody>
           <a:bodyPr/>
+          <a:lstStyle/>
           <a:p>
             <a:pPr marL="432000" indent="-324000">
               <a:buClr>
@@ -1633,33 +1791,22 @@
               <a:buChar char=""/>
             </a:pPr>
             <a:r>
-              <a:rPr b="0" lang="en-US" sz="1800" spc="-1" strike="noStrike">
+              <a:rPr lang="en-US" sz="1800" b="0" strike="noStrike" spc="-1">
                 <a:solidFill>
                   <a:srgbClr val="000000"/>
                 </a:solidFill>
                 <a:uFill>
                   <a:solidFill>
-                    <a:srgbClr val="ffffff"/>
+                    <a:srgbClr val="FFFFFF"/>
                   </a:solidFill>
                 </a:uFill>
                 <a:latin typeface="Century Gothic"/>
               </a:rPr>
               <a:t>Click to edit the outline text format</a:t>
             </a:r>
-            <a:endParaRPr b="0" lang="en-US" sz="1800" spc="-1" strike="noStrike">
-              <a:solidFill>
-                <a:srgbClr val="000000"/>
-              </a:solidFill>
-              <a:uFill>
-                <a:solidFill>
-                  <a:srgbClr val="ffffff"/>
-                </a:solidFill>
-              </a:uFill>
-              <a:latin typeface="Century Gothic"/>
-            </a:endParaRPr>
-          </a:p>
-          <a:p>
-            <a:pPr lvl="1" marL="864000" indent="-324000">
+          </a:p>
+          <a:p>
+            <a:pPr marL="864000" lvl="1" indent="-324000">
               <a:buClr>
                 <a:srgbClr val="000000"/>
               </a:buClr>
@@ -1668,33 +1815,22 @@
               <a:buChar char=""/>
             </a:pPr>
             <a:r>
-              <a:rPr b="0" lang="en-US" sz="1800" spc="-1" strike="noStrike">
+              <a:rPr lang="en-US" sz="1800" b="0" strike="noStrike" spc="-1">
                 <a:solidFill>
                   <a:srgbClr val="000000"/>
                 </a:solidFill>
                 <a:uFill>
                   <a:solidFill>
-                    <a:srgbClr val="ffffff"/>
+                    <a:srgbClr val="FFFFFF"/>
                   </a:solidFill>
                 </a:uFill>
                 <a:latin typeface="Century Gothic"/>
               </a:rPr>
               <a:t>Second Outline Level</a:t>
             </a:r>
-            <a:endParaRPr b="0" lang="en-US" sz="1800" spc="-1" strike="noStrike">
-              <a:solidFill>
-                <a:srgbClr val="000000"/>
-              </a:solidFill>
-              <a:uFill>
-                <a:solidFill>
-                  <a:srgbClr val="ffffff"/>
-                </a:solidFill>
-              </a:uFill>
-              <a:latin typeface="Century Gothic"/>
-            </a:endParaRPr>
-          </a:p>
-          <a:p>
-            <a:pPr lvl="2" marL="1296000" indent="-288000">
+          </a:p>
+          <a:p>
+            <a:pPr marL="1296000" lvl="2" indent="-288000">
               <a:buClr>
                 <a:srgbClr val="000000"/>
               </a:buClr>
@@ -1703,33 +1839,22 @@
               <a:buChar char=""/>
             </a:pPr>
             <a:r>
-              <a:rPr b="0" lang="en-US" sz="1800" spc="-1" strike="noStrike">
+              <a:rPr lang="en-US" sz="1800" b="0" strike="noStrike" spc="-1">
                 <a:solidFill>
                   <a:srgbClr val="000000"/>
                 </a:solidFill>
                 <a:uFill>
                   <a:solidFill>
-                    <a:srgbClr val="ffffff"/>
+                    <a:srgbClr val="FFFFFF"/>
                   </a:solidFill>
                 </a:uFill>
                 <a:latin typeface="Century Gothic"/>
               </a:rPr>
               <a:t>Third Outline Level</a:t>
             </a:r>
-            <a:endParaRPr b="0" lang="en-US" sz="1800" spc="-1" strike="noStrike">
-              <a:solidFill>
-                <a:srgbClr val="000000"/>
-              </a:solidFill>
-              <a:uFill>
-                <a:solidFill>
-                  <a:srgbClr val="ffffff"/>
-                </a:solidFill>
-              </a:uFill>
-              <a:latin typeface="Century Gothic"/>
-            </a:endParaRPr>
-          </a:p>
-          <a:p>
-            <a:pPr lvl="3" marL="1728000" indent="-216000">
+          </a:p>
+          <a:p>
+            <a:pPr marL="1728000" lvl="3" indent="-216000">
               <a:buClr>
                 <a:srgbClr val="000000"/>
               </a:buClr>
@@ -1738,33 +1863,22 @@
               <a:buChar char=""/>
             </a:pPr>
             <a:r>
-              <a:rPr b="0" lang="en-US" sz="1800" spc="-1" strike="noStrike">
+              <a:rPr lang="en-US" sz="1800" b="0" strike="noStrike" spc="-1">
                 <a:solidFill>
                   <a:srgbClr val="000000"/>
                 </a:solidFill>
                 <a:uFill>
                   <a:solidFill>
-                    <a:srgbClr val="ffffff"/>
+                    <a:srgbClr val="FFFFFF"/>
                   </a:solidFill>
                 </a:uFill>
                 <a:latin typeface="Century Gothic"/>
               </a:rPr>
               <a:t>Fourth Outline Level</a:t>
             </a:r>
-            <a:endParaRPr b="0" lang="en-US" sz="1800" spc="-1" strike="noStrike">
-              <a:solidFill>
-                <a:srgbClr val="000000"/>
-              </a:solidFill>
-              <a:uFill>
-                <a:solidFill>
-                  <a:srgbClr val="ffffff"/>
-                </a:solidFill>
-              </a:uFill>
-              <a:latin typeface="Century Gothic"/>
-            </a:endParaRPr>
-          </a:p>
-          <a:p>
-            <a:pPr lvl="4" marL="2160000" indent="-216000">
+          </a:p>
+          <a:p>
+            <a:pPr marL="2160000" lvl="4" indent="-216000">
               <a:buClr>
                 <a:srgbClr val="000000"/>
               </a:buClr>
@@ -1773,33 +1887,22 @@
               <a:buChar char=""/>
             </a:pPr>
             <a:r>
-              <a:rPr b="0" lang="en-US" sz="1800" spc="-1" strike="noStrike">
+              <a:rPr lang="en-US" sz="1800" b="0" strike="noStrike" spc="-1">
                 <a:solidFill>
                   <a:srgbClr val="000000"/>
                 </a:solidFill>
                 <a:uFill>
                   <a:solidFill>
-                    <a:srgbClr val="ffffff"/>
+                    <a:srgbClr val="FFFFFF"/>
                   </a:solidFill>
                 </a:uFill>
                 <a:latin typeface="Century Gothic"/>
               </a:rPr>
               <a:t>Fifth Outline Level</a:t>
             </a:r>
-            <a:endParaRPr b="0" lang="en-US" sz="1800" spc="-1" strike="noStrike">
-              <a:solidFill>
-                <a:srgbClr val="000000"/>
-              </a:solidFill>
-              <a:uFill>
-                <a:solidFill>
-                  <a:srgbClr val="ffffff"/>
-                </a:solidFill>
-              </a:uFill>
-              <a:latin typeface="Century Gothic"/>
-            </a:endParaRPr>
-          </a:p>
-          <a:p>
-            <a:pPr lvl="5" marL="2592000" indent="-216000">
+          </a:p>
+          <a:p>
+            <a:pPr marL="2592000" lvl="5" indent="-216000">
               <a:buClr>
                 <a:srgbClr val="000000"/>
               </a:buClr>
@@ -1808,30 +1911,19 @@
               <a:buChar char=""/>
             </a:pPr>
             <a:r>
-              <a:rPr b="0" lang="en-US" sz="1800" spc="-1" strike="noStrike">
+              <a:rPr lang="en-US" sz="1800" b="0" strike="noStrike" spc="-1">
                 <a:solidFill>
                   <a:srgbClr val="000000"/>
                 </a:solidFill>
                 <a:uFill>
                   <a:solidFill>
-                    <a:srgbClr val="ffffff"/>
+                    <a:srgbClr val="FFFFFF"/>
                   </a:solidFill>
                 </a:uFill>
                 <a:latin typeface="Century Gothic"/>
               </a:rPr>
               <a:t>Sixth Outline Level</a:t>
             </a:r>
-            <a:endParaRPr b="0" lang="en-US" sz="1800" spc="-1" strike="noStrike">
-              <a:solidFill>
-                <a:srgbClr val="000000"/>
-              </a:solidFill>
-              <a:uFill>
-                <a:solidFill>
-                  <a:srgbClr val="ffffff"/>
-                </a:solidFill>
-              </a:uFill>
-              <a:latin typeface="Century Gothic"/>
-            </a:endParaRPr>
           </a:p>
           <a:p>
             <a:pPr marL="182880" indent="-182520">
@@ -1845,33 +1937,22 @@
               <a:buChar char="◦"/>
             </a:pPr>
             <a:r>
-              <a:rPr b="0" lang="en-US" sz="1800" spc="-1" strike="noStrike">
+              <a:rPr lang="en-US" sz="1800" b="0" strike="noStrike" spc="-1">
                 <a:solidFill>
                   <a:srgbClr val="000000"/>
                 </a:solidFill>
                 <a:uFill>
                   <a:solidFill>
-                    <a:srgbClr val="ffffff"/>
+                    <a:srgbClr val="FFFFFF"/>
                   </a:solidFill>
                 </a:uFill>
                 <a:latin typeface="Century Gothic"/>
               </a:rPr>
               <a:t>Seventh Outline LevelClick to edit Master text styles</a:t>
             </a:r>
-            <a:endParaRPr b="0" lang="en-US" sz="1800" spc="-1" strike="noStrike">
-              <a:solidFill>
-                <a:srgbClr val="000000"/>
-              </a:solidFill>
-              <a:uFill>
-                <a:solidFill>
-                  <a:srgbClr val="ffffff"/>
-                </a:solidFill>
-              </a:uFill>
-              <a:latin typeface="Century Gothic"/>
-            </a:endParaRPr>
-          </a:p>
-          <a:p>
-            <a:pPr lvl="1" marL="457200" indent="-182520">
+          </a:p>
+          <a:p>
+            <a:pPr marL="457200" lvl="1" indent="-182520">
               <a:lnSpc>
                 <a:spcPct val="100000"/>
               </a:lnSpc>
@@ -1882,33 +1963,33 @@
               <a:buChar char="◦"/>
             </a:pPr>
             <a:r>
-              <a:rPr b="0" lang="en-US" sz="1600" spc="-1" strike="noStrike">
+              <a:rPr lang="en-US" sz="1600" b="0" strike="noStrike" spc="-1">
                 <a:solidFill>
                   <a:srgbClr val="000000"/>
                 </a:solidFill>
                 <a:uFill>
                   <a:solidFill>
-                    <a:srgbClr val="ffffff"/>
+                    <a:srgbClr val="FFFFFF"/>
                   </a:solidFill>
                 </a:uFill>
                 <a:latin typeface="Century Gothic"/>
               </a:rPr>
               <a:t>Second level</a:t>
             </a:r>
-            <a:endParaRPr b="0" lang="en-US" sz="1800" spc="-1" strike="noStrike">
-              <a:solidFill>
-                <a:srgbClr val="000000"/>
-              </a:solidFill>
-              <a:uFill>
-                <a:solidFill>
-                  <a:srgbClr val="ffffff"/>
-                </a:solidFill>
-              </a:uFill>
-              <a:latin typeface="Century Gothic"/>
-            </a:endParaRPr>
-          </a:p>
-          <a:p>
-            <a:pPr lvl="2" marL="731520" indent="-182520">
+            <a:endParaRPr lang="en-US" sz="1800" b="0" strike="noStrike" spc="-1">
+              <a:solidFill>
+                <a:srgbClr val="000000"/>
+              </a:solidFill>
+              <a:uFill>
+                <a:solidFill>
+                  <a:srgbClr val="FFFFFF"/>
+                </a:solidFill>
+              </a:uFill>
+              <a:latin typeface="Century Gothic"/>
+            </a:endParaRPr>
+          </a:p>
+          <a:p>
+            <a:pPr marL="731520" lvl="2" indent="-182520">
               <a:lnSpc>
                 <a:spcPct val="100000"/>
               </a:lnSpc>
@@ -1919,33 +2000,33 @@
               <a:buChar char="◦"/>
             </a:pPr>
             <a:r>
-              <a:rPr b="0" lang="en-US" sz="1400" spc="-1" strike="noStrike">
+              <a:rPr lang="en-US" sz="1400" b="0" strike="noStrike" spc="-1">
                 <a:solidFill>
                   <a:srgbClr val="000000"/>
                 </a:solidFill>
                 <a:uFill>
                   <a:solidFill>
-                    <a:srgbClr val="ffffff"/>
+                    <a:srgbClr val="FFFFFF"/>
                   </a:solidFill>
                 </a:uFill>
                 <a:latin typeface="Century Gothic"/>
               </a:rPr>
               <a:t>Third level</a:t>
             </a:r>
-            <a:endParaRPr b="0" lang="en-US" sz="1800" spc="-1" strike="noStrike">
-              <a:solidFill>
-                <a:srgbClr val="000000"/>
-              </a:solidFill>
-              <a:uFill>
-                <a:solidFill>
-                  <a:srgbClr val="ffffff"/>
-                </a:solidFill>
-              </a:uFill>
-              <a:latin typeface="Century Gothic"/>
-            </a:endParaRPr>
-          </a:p>
-          <a:p>
-            <a:pPr lvl="3" marL="1005840" indent="-182520">
+            <a:endParaRPr lang="en-US" sz="1800" b="0" strike="noStrike" spc="-1">
+              <a:solidFill>
+                <a:srgbClr val="000000"/>
+              </a:solidFill>
+              <a:uFill>
+                <a:solidFill>
+                  <a:srgbClr val="FFFFFF"/>
+                </a:solidFill>
+              </a:uFill>
+              <a:latin typeface="Century Gothic"/>
+            </a:endParaRPr>
+          </a:p>
+          <a:p>
+            <a:pPr marL="1005840" lvl="3" indent="-182520">
               <a:lnSpc>
                 <a:spcPct val="100000"/>
               </a:lnSpc>
@@ -1956,33 +2037,33 @@
               <a:buChar char="◦"/>
             </a:pPr>
             <a:r>
-              <a:rPr b="0" lang="en-US" sz="1400" spc="-1" strike="noStrike">
+              <a:rPr lang="en-US" sz="1400" b="0" strike="noStrike" spc="-1">
                 <a:solidFill>
                   <a:srgbClr val="000000"/>
                 </a:solidFill>
                 <a:uFill>
                   <a:solidFill>
-                    <a:srgbClr val="ffffff"/>
+                    <a:srgbClr val="FFFFFF"/>
                   </a:solidFill>
                 </a:uFill>
                 <a:latin typeface="Century Gothic"/>
               </a:rPr>
               <a:t>Fourth level</a:t>
             </a:r>
-            <a:endParaRPr b="0" lang="en-US" sz="1800" spc="-1" strike="noStrike">
-              <a:solidFill>
-                <a:srgbClr val="000000"/>
-              </a:solidFill>
-              <a:uFill>
-                <a:solidFill>
-                  <a:srgbClr val="ffffff"/>
-                </a:solidFill>
-              </a:uFill>
-              <a:latin typeface="Century Gothic"/>
-            </a:endParaRPr>
-          </a:p>
-          <a:p>
-            <a:pPr lvl="4" marL="1280160" indent="-182520">
+            <a:endParaRPr lang="en-US" sz="1800" b="0" strike="noStrike" spc="-1">
+              <a:solidFill>
+                <a:srgbClr val="000000"/>
+              </a:solidFill>
+              <a:uFill>
+                <a:solidFill>
+                  <a:srgbClr val="FFFFFF"/>
+                </a:solidFill>
+              </a:uFill>
+              <a:latin typeface="Century Gothic"/>
+            </a:endParaRPr>
+          </a:p>
+          <a:p>
+            <a:pPr marL="1280160" lvl="4" indent="-182520">
               <a:lnSpc>
                 <a:spcPct val="100000"/>
               </a:lnSpc>
@@ -1993,26 +2074,26 @@
               <a:buChar char="◦"/>
             </a:pPr>
             <a:r>
-              <a:rPr b="0" lang="en-US" sz="1400" spc="-1" strike="noStrike">
+              <a:rPr lang="en-US" sz="1400" b="0" strike="noStrike" spc="-1">
                 <a:solidFill>
                   <a:srgbClr val="000000"/>
                 </a:solidFill>
                 <a:uFill>
                   <a:solidFill>
-                    <a:srgbClr val="ffffff"/>
+                    <a:srgbClr val="FFFFFF"/>
                   </a:solidFill>
                 </a:uFill>
                 <a:latin typeface="Century Gothic"/>
               </a:rPr>
               <a:t>Fifth level</a:t>
             </a:r>
-            <a:endParaRPr b="0" lang="en-US" sz="1800" spc="-1" strike="noStrike">
-              <a:solidFill>
-                <a:srgbClr val="000000"/>
-              </a:solidFill>
-              <a:uFill>
-                <a:solidFill>
-                  <a:srgbClr val="ffffff"/>
+            <a:endParaRPr lang="en-US" sz="1800" b="0" strike="noStrike" spc="-1">
+              <a:solidFill>
+                <a:srgbClr val="000000"/>
+              </a:solidFill>
+              <a:uFill>
+                <a:solidFill>
+                  <a:srgbClr val="FFFFFF"/>
                 </a:solidFill>
               </a:uFill>
               <a:latin typeface="Century Gothic"/>
@@ -2041,6 +2122,7 @@
         </p:spPr>
         <p:txBody>
           <a:bodyPr anchor="b"/>
+          <a:lstStyle/>
           <a:p>
             <a:pPr>
               <a:lnSpc>
@@ -2048,26 +2130,26 @@
               </a:lnSpc>
             </a:pPr>
             <a:r>
-              <a:rPr b="0" lang="en-US" sz="1000" spc="-1" strike="noStrike">
+              <a:rPr lang="en-US" sz="1000" b="0" strike="noStrike" spc="-1">
                 <a:solidFill>
                   <a:srgbClr val="404040"/>
                 </a:solidFill>
                 <a:uFill>
                   <a:solidFill>
-                    <a:srgbClr val="ffffff"/>
+                    <a:srgbClr val="FFFFFF"/>
                   </a:solidFill>
                 </a:uFill>
                 <a:latin typeface="Century Gothic"/>
               </a:rPr>
               <a:t>4/30/17</a:t>
             </a:r>
-            <a:endParaRPr b="0" lang="en-US" sz="1400" spc="-1" strike="noStrike">
-              <a:solidFill>
-                <a:srgbClr val="000000"/>
-              </a:solidFill>
-              <a:uFill>
-                <a:solidFill>
-                  <a:srgbClr val="ffffff"/>
+            <a:endParaRPr lang="en-US" sz="1400" b="0" strike="noStrike" spc="-1">
+              <a:solidFill>
+                <a:srgbClr val="000000"/>
+              </a:solidFill>
+              <a:uFill>
+                <a:solidFill>
+                  <a:srgbClr val="FFFFFF"/>
                 </a:solidFill>
               </a:uFill>
               <a:latin typeface="Times New Roman"/>
@@ -2096,14 +2178,15 @@
         </p:spPr>
         <p:txBody>
           <a:bodyPr anchor="b"/>
-          <a:p>
-            <a:endParaRPr b="0" lang="en-US" sz="2400" spc="-1" strike="noStrike">
-              <a:solidFill>
-                <a:srgbClr val="000000"/>
-              </a:solidFill>
-              <a:uFill>
-                <a:solidFill>
-                  <a:srgbClr val="ffffff"/>
+          <a:lstStyle/>
+          <a:p>
+            <a:endParaRPr lang="en-US" sz="2400" b="0" strike="noStrike" spc="-1">
+              <a:solidFill>
+                <a:srgbClr val="000000"/>
+              </a:solidFill>
+              <a:uFill>
+                <a:solidFill>
+                  <a:srgbClr val="FFFFFF"/>
                 </a:solidFill>
               </a:uFill>
               <a:latin typeface="Times New Roman"/>
@@ -2132,6 +2215,7 @@
         </p:spPr>
         <p:txBody>
           <a:bodyPr anchor="b"/>
+          <a:lstStyle/>
           <a:p>
             <a:pPr algn="r">
               <a:lnSpc>
@@ -2139,26 +2223,26 @@
               </a:lnSpc>
             </a:pPr>
             <a:fld id="{31DD4041-8182-41ED-9FBD-3F313AE1F8F2}" type="slidenum">
-              <a:rPr b="0" lang="en-US" sz="1000" spc="-1" strike="noStrike">
+              <a:rPr lang="en-US" sz="1000" b="0" strike="noStrike" spc="-1">
                 <a:solidFill>
                   <a:srgbClr val="404040"/>
                 </a:solidFill>
                 <a:uFill>
                   <a:solidFill>
-                    <a:srgbClr val="ffffff"/>
-                  </a:solidFill>
-                </a:uFill>
-                <a:latin typeface="Century Gothic"/>
-              </a:rPr>
-              <a:t>&lt;number&gt;</a:t>
+                    <a:srgbClr val="FFFFFF"/>
+                  </a:solidFill>
+                </a:uFill>
+                <a:latin typeface="Century Gothic"/>
+              </a:rPr>
+              <a:t>‹#›</a:t>
             </a:fld>
-            <a:endParaRPr b="0" lang="en-US" sz="1400" spc="-1" strike="noStrike">
-              <a:solidFill>
-                <a:srgbClr val="000000"/>
-              </a:solidFill>
-              <a:uFill>
-                <a:solidFill>
-                  <a:srgbClr val="ffffff"/>
+            <a:endParaRPr lang="en-US" sz="1400" b="0" strike="noStrike" spc="-1">
+              <a:solidFill>
+                <a:srgbClr val="000000"/>
+              </a:solidFill>
+              <a:uFill>
+                <a:solidFill>
+                  <a:srgbClr val="FFFFFF"/>
                 </a:solidFill>
               </a:uFill>
               <a:latin typeface="Times New Roman"/>
@@ -2168,26 +2252,306 @@
       </p:sp>
     </p:spTree>
   </p:cSld>
-  <p:clrMap bg1="lt1" bg2="lt2" tx1="dk1" tx2="dk2" accent1="accent1" accent2="accent2" accent3="accent3" accent4="accent4" accent5="accent5" accent6="accent6" hlink="hlink" folHlink="folHlink"/>
+  <p:clrMap bg1="lt1" tx1="dk1" bg2="lt2" tx2="dk2" accent1="accent1" accent2="accent2" accent3="accent3" accent4="accent4" accent5="accent5" accent6="accent6" hlink="hlink" folHlink="folHlink"/>
   <p:sldLayoutIdLst>
-    <p:sldLayoutId id="2147483649" r:id="rId2"/>
-    <p:sldLayoutId id="2147483650" r:id="rId3"/>
-    <p:sldLayoutId id="2147483651" r:id="rId4"/>
-    <p:sldLayoutId id="2147483652" r:id="rId5"/>
-    <p:sldLayoutId id="2147483653" r:id="rId6"/>
-    <p:sldLayoutId id="2147483654" r:id="rId7"/>
-    <p:sldLayoutId id="2147483655" r:id="rId8"/>
-    <p:sldLayoutId id="2147483656" r:id="rId9"/>
-    <p:sldLayoutId id="2147483657" r:id="rId10"/>
-    <p:sldLayoutId id="2147483658" r:id="rId11"/>
-    <p:sldLayoutId id="2147483659" r:id="rId12"/>
-    <p:sldLayoutId id="2147483660" r:id="rId13"/>
+    <p:sldLayoutId id="2147483649" r:id="rId1"/>
+    <p:sldLayoutId id="2147483650" r:id="rId2"/>
+    <p:sldLayoutId id="2147483651" r:id="rId3"/>
+    <p:sldLayoutId id="2147483652" r:id="rId4"/>
+    <p:sldLayoutId id="2147483653" r:id="rId5"/>
+    <p:sldLayoutId id="2147483654" r:id="rId6"/>
+    <p:sldLayoutId id="2147483655" r:id="rId7"/>
+    <p:sldLayoutId id="2147483656" r:id="rId8"/>
+    <p:sldLayoutId id="2147483657" r:id="rId9"/>
+    <p:sldLayoutId id="2147483658" r:id="rId10"/>
+    <p:sldLayoutId id="2147483659" r:id="rId11"/>
+    <p:sldLayoutId id="2147483660" r:id="rId12"/>
   </p:sldLayoutIdLst>
+  <p:txStyles>
+    <p:titleStyle>
+      <a:lvl1pPr algn="l" defTabSz="914400" rtl="0" eaLnBrk="1" latinLnBrk="0" hangingPunct="1">
+        <a:lnSpc>
+          <a:spcPct val="90000"/>
+        </a:lnSpc>
+        <a:spcBef>
+          <a:spcPct val="0"/>
+        </a:spcBef>
+        <a:buNone/>
+        <a:defRPr sz="4400" kern="1200">
+          <a:solidFill>
+            <a:schemeClr val="tx1"/>
+          </a:solidFill>
+          <a:latin typeface="+mj-lt"/>
+          <a:ea typeface="+mj-ea"/>
+          <a:cs typeface="+mj-cs"/>
+        </a:defRPr>
+      </a:lvl1pPr>
+    </p:titleStyle>
+    <p:bodyStyle>
+      <a:lvl1pPr marL="228600" indent="-228600" algn="l" defTabSz="914400" rtl="0" eaLnBrk="1" latinLnBrk="0" hangingPunct="1">
+        <a:lnSpc>
+          <a:spcPct val="90000"/>
+        </a:lnSpc>
+        <a:spcBef>
+          <a:spcPts val="1000"/>
+        </a:spcBef>
+        <a:buFont typeface="Arial" panose="020B0604020202020204" pitchFamily="34" charset="0"/>
+        <a:buChar char="•"/>
+        <a:defRPr sz="2800" kern="1200">
+          <a:solidFill>
+            <a:schemeClr val="tx1"/>
+          </a:solidFill>
+          <a:latin typeface="+mn-lt"/>
+          <a:ea typeface="+mn-ea"/>
+          <a:cs typeface="+mn-cs"/>
+        </a:defRPr>
+      </a:lvl1pPr>
+      <a:lvl2pPr marL="685800" indent="-228600" algn="l" defTabSz="914400" rtl="0" eaLnBrk="1" latinLnBrk="0" hangingPunct="1">
+        <a:lnSpc>
+          <a:spcPct val="90000"/>
+        </a:lnSpc>
+        <a:spcBef>
+          <a:spcPts val="500"/>
+        </a:spcBef>
+        <a:buFont typeface="Arial" panose="020B0604020202020204" pitchFamily="34" charset="0"/>
+        <a:buChar char="•"/>
+        <a:defRPr sz="2400" kern="1200">
+          <a:solidFill>
+            <a:schemeClr val="tx1"/>
+          </a:solidFill>
+          <a:latin typeface="+mn-lt"/>
+          <a:ea typeface="+mn-ea"/>
+          <a:cs typeface="+mn-cs"/>
+        </a:defRPr>
+      </a:lvl2pPr>
+      <a:lvl3pPr marL="1143000" indent="-228600" algn="l" defTabSz="914400" rtl="0" eaLnBrk="1" latinLnBrk="0" hangingPunct="1">
+        <a:lnSpc>
+          <a:spcPct val="90000"/>
+        </a:lnSpc>
+        <a:spcBef>
+          <a:spcPts val="500"/>
+        </a:spcBef>
+        <a:buFont typeface="Arial" panose="020B0604020202020204" pitchFamily="34" charset="0"/>
+        <a:buChar char="•"/>
+        <a:defRPr sz="2000" kern="1200">
+          <a:solidFill>
+            <a:schemeClr val="tx1"/>
+          </a:solidFill>
+          <a:latin typeface="+mn-lt"/>
+          <a:ea typeface="+mn-ea"/>
+          <a:cs typeface="+mn-cs"/>
+        </a:defRPr>
+      </a:lvl3pPr>
+      <a:lvl4pPr marL="1600200" indent="-228600" algn="l" defTabSz="914400" rtl="0" eaLnBrk="1" latinLnBrk="0" hangingPunct="1">
+        <a:lnSpc>
+          <a:spcPct val="90000"/>
+        </a:lnSpc>
+        <a:spcBef>
+          <a:spcPts val="500"/>
+        </a:spcBef>
+        <a:buFont typeface="Arial" panose="020B0604020202020204" pitchFamily="34" charset="0"/>
+        <a:buChar char="•"/>
+        <a:defRPr sz="1800" kern="1200">
+          <a:solidFill>
+            <a:schemeClr val="tx1"/>
+          </a:solidFill>
+          <a:latin typeface="+mn-lt"/>
+          <a:ea typeface="+mn-ea"/>
+          <a:cs typeface="+mn-cs"/>
+        </a:defRPr>
+      </a:lvl4pPr>
+      <a:lvl5pPr marL="2057400" indent="-228600" algn="l" defTabSz="914400" rtl="0" eaLnBrk="1" latinLnBrk="0" hangingPunct="1">
+        <a:lnSpc>
+          <a:spcPct val="90000"/>
+        </a:lnSpc>
+        <a:spcBef>
+          <a:spcPts val="500"/>
+        </a:spcBef>
+        <a:buFont typeface="Arial" panose="020B0604020202020204" pitchFamily="34" charset="0"/>
+        <a:buChar char="•"/>
+        <a:defRPr sz="1800" kern="1200">
+          <a:solidFill>
+            <a:schemeClr val="tx1"/>
+          </a:solidFill>
+          <a:latin typeface="+mn-lt"/>
+          <a:ea typeface="+mn-ea"/>
+          <a:cs typeface="+mn-cs"/>
+        </a:defRPr>
+      </a:lvl5pPr>
+      <a:lvl6pPr marL="2514600" indent="-228600" algn="l" defTabSz="914400" rtl="0" eaLnBrk="1" latinLnBrk="0" hangingPunct="1">
+        <a:lnSpc>
+          <a:spcPct val="90000"/>
+        </a:lnSpc>
+        <a:spcBef>
+          <a:spcPts val="500"/>
+        </a:spcBef>
+        <a:buFont typeface="Arial" panose="020B0604020202020204" pitchFamily="34" charset="0"/>
+        <a:buChar char="•"/>
+        <a:defRPr sz="1800" kern="1200">
+          <a:solidFill>
+            <a:schemeClr val="tx1"/>
+          </a:solidFill>
+          <a:latin typeface="+mn-lt"/>
+          <a:ea typeface="+mn-ea"/>
+          <a:cs typeface="+mn-cs"/>
+        </a:defRPr>
+      </a:lvl6pPr>
+      <a:lvl7pPr marL="2971800" indent="-228600" algn="l" defTabSz="914400" rtl="0" eaLnBrk="1" latinLnBrk="0" hangingPunct="1">
+        <a:lnSpc>
+          <a:spcPct val="90000"/>
+        </a:lnSpc>
+        <a:spcBef>
+          <a:spcPts val="500"/>
+        </a:spcBef>
+        <a:buFont typeface="Arial" panose="020B0604020202020204" pitchFamily="34" charset="0"/>
+        <a:buChar char="•"/>
+        <a:defRPr sz="1800" kern="1200">
+          <a:solidFill>
+            <a:schemeClr val="tx1"/>
+          </a:solidFill>
+          <a:latin typeface="+mn-lt"/>
+          <a:ea typeface="+mn-ea"/>
+          <a:cs typeface="+mn-cs"/>
+        </a:defRPr>
+      </a:lvl7pPr>
+      <a:lvl8pPr marL="3429000" indent="-228600" algn="l" defTabSz="914400" rtl="0" eaLnBrk="1" latinLnBrk="0" hangingPunct="1">
+        <a:lnSpc>
+          <a:spcPct val="90000"/>
+        </a:lnSpc>
+        <a:spcBef>
+          <a:spcPts val="500"/>
+        </a:spcBef>
+        <a:buFont typeface="Arial" panose="020B0604020202020204" pitchFamily="34" charset="0"/>
+        <a:buChar char="•"/>
+        <a:defRPr sz="1800" kern="1200">
+          <a:solidFill>
+            <a:schemeClr val="tx1"/>
+          </a:solidFill>
+          <a:latin typeface="+mn-lt"/>
+          <a:ea typeface="+mn-ea"/>
+          <a:cs typeface="+mn-cs"/>
+        </a:defRPr>
+      </a:lvl8pPr>
+      <a:lvl9pPr marL="3886200" indent="-228600" algn="l" defTabSz="914400" rtl="0" eaLnBrk="1" latinLnBrk="0" hangingPunct="1">
+        <a:lnSpc>
+          <a:spcPct val="90000"/>
+        </a:lnSpc>
+        <a:spcBef>
+          <a:spcPts val="500"/>
+        </a:spcBef>
+        <a:buFont typeface="Arial" panose="020B0604020202020204" pitchFamily="34" charset="0"/>
+        <a:buChar char="•"/>
+        <a:defRPr sz="1800" kern="1200">
+          <a:solidFill>
+            <a:schemeClr val="tx1"/>
+          </a:solidFill>
+          <a:latin typeface="+mn-lt"/>
+          <a:ea typeface="+mn-ea"/>
+          <a:cs typeface="+mn-cs"/>
+        </a:defRPr>
+      </a:lvl9pPr>
+    </p:bodyStyle>
+    <p:otherStyle>
+      <a:defPPr>
+        <a:defRPr lang="en-US"/>
+      </a:defPPr>
+      <a:lvl1pPr marL="0" algn="l" defTabSz="914400" rtl="0" eaLnBrk="1" latinLnBrk="0" hangingPunct="1">
+        <a:defRPr sz="1800" kern="1200">
+          <a:solidFill>
+            <a:schemeClr val="tx1"/>
+          </a:solidFill>
+          <a:latin typeface="+mn-lt"/>
+          <a:ea typeface="+mn-ea"/>
+          <a:cs typeface="+mn-cs"/>
+        </a:defRPr>
+      </a:lvl1pPr>
+      <a:lvl2pPr marL="457200" algn="l" defTabSz="914400" rtl="0" eaLnBrk="1" latinLnBrk="0" hangingPunct="1">
+        <a:defRPr sz="1800" kern="1200">
+          <a:solidFill>
+            <a:schemeClr val="tx1"/>
+          </a:solidFill>
+          <a:latin typeface="+mn-lt"/>
+          <a:ea typeface="+mn-ea"/>
+          <a:cs typeface="+mn-cs"/>
+        </a:defRPr>
+      </a:lvl2pPr>
+      <a:lvl3pPr marL="914400" algn="l" defTabSz="914400" rtl="0" eaLnBrk="1" latinLnBrk="0" hangingPunct="1">
+        <a:defRPr sz="1800" kern="1200">
+          <a:solidFill>
+            <a:schemeClr val="tx1"/>
+          </a:solidFill>
+          <a:latin typeface="+mn-lt"/>
+          <a:ea typeface="+mn-ea"/>
+          <a:cs typeface="+mn-cs"/>
+        </a:defRPr>
+      </a:lvl3pPr>
+      <a:lvl4pPr marL="1371600" algn="l" defTabSz="914400" rtl="0" eaLnBrk="1" latinLnBrk="0" hangingPunct="1">
+        <a:defRPr sz="1800" kern="1200">
+          <a:solidFill>
+            <a:schemeClr val="tx1"/>
+          </a:solidFill>
+          <a:latin typeface="+mn-lt"/>
+          <a:ea typeface="+mn-ea"/>
+          <a:cs typeface="+mn-cs"/>
+        </a:defRPr>
+      </a:lvl4pPr>
+      <a:lvl5pPr marL="1828800" algn="l" defTabSz="914400" rtl="0" eaLnBrk="1" latinLnBrk="0" hangingPunct="1">
+        <a:defRPr sz="1800" kern="1200">
+          <a:solidFill>
+            <a:schemeClr val="tx1"/>
+          </a:solidFill>
+          <a:latin typeface="+mn-lt"/>
+          <a:ea typeface="+mn-ea"/>
+          <a:cs typeface="+mn-cs"/>
+        </a:defRPr>
+      </a:lvl5pPr>
+      <a:lvl6pPr marL="2286000" algn="l" defTabSz="914400" rtl="0" eaLnBrk="1" latinLnBrk="0" hangingPunct="1">
+        <a:defRPr sz="1800" kern="1200">
+          <a:solidFill>
+            <a:schemeClr val="tx1"/>
+          </a:solidFill>
+          <a:latin typeface="+mn-lt"/>
+          <a:ea typeface="+mn-ea"/>
+          <a:cs typeface="+mn-cs"/>
+        </a:defRPr>
+      </a:lvl6pPr>
+      <a:lvl7pPr marL="2743200" algn="l" defTabSz="914400" rtl="0" eaLnBrk="1" latinLnBrk="0" hangingPunct="1">
+        <a:defRPr sz="1800" kern="1200">
+          <a:solidFill>
+            <a:schemeClr val="tx1"/>
+          </a:solidFill>
+          <a:latin typeface="+mn-lt"/>
+          <a:ea typeface="+mn-ea"/>
+          <a:cs typeface="+mn-cs"/>
+        </a:defRPr>
+      </a:lvl7pPr>
+      <a:lvl8pPr marL="3200400" algn="l" defTabSz="914400" rtl="0" eaLnBrk="1" latinLnBrk="0" hangingPunct="1">
+        <a:defRPr sz="1800" kern="1200">
+          <a:solidFill>
+            <a:schemeClr val="tx1"/>
+          </a:solidFill>
+          <a:latin typeface="+mn-lt"/>
+          <a:ea typeface="+mn-ea"/>
+          <a:cs typeface="+mn-cs"/>
+        </a:defRPr>
+      </a:lvl8pPr>
+      <a:lvl9pPr marL="3657600" algn="l" defTabSz="914400" rtl="0" eaLnBrk="1" latinLnBrk="0" hangingPunct="1">
+        <a:defRPr sz="1800" kern="1200">
+          <a:solidFill>
+            <a:schemeClr val="tx1"/>
+          </a:solidFill>
+          <a:latin typeface="+mn-lt"/>
+          <a:ea typeface="+mn-ea"/>
+          <a:cs typeface="+mn-cs"/>
+        </a:defRPr>
+      </a:lvl9pPr>
+    </p:otherStyle>
+  </p:txStyles>
 </p:sldMaster>
 </file>
 
 <file path=ppt/slides/slide1.xml><?xml version="1.0" encoding="utf-8"?>
-<p:sld xmlns:a="http://schemas.openxmlformats.org/drawingml/2006/main" xmlns:p="http://schemas.openxmlformats.org/presentationml/2006/main" xmlns:r="http://schemas.openxmlformats.org/officeDocument/2006/relationships" xmlns:p14="http://schemas.microsoft.com/office/powerpoint/2010/main" xmlns:p15="http://schemas.microsoft.com/office/powerpoint/2012/main" xmlns:mc="http://schemas.openxmlformats.org/markup-compatibility/2006">
+<p:sld xmlns:a="http://schemas.openxmlformats.org/drawingml/2006/main" xmlns:r="http://schemas.openxmlformats.org/officeDocument/2006/relationships" xmlns:p="http://schemas.openxmlformats.org/presentationml/2006/main">
   <p:cSld>
     <p:spTree>
       <p:nvGrpSpPr>
@@ -2224,6 +2588,7 @@
         </p:spPr>
         <p:txBody>
           <a:bodyPr anchor="ctr"/>
+          <a:lstStyle/>
           <a:p>
             <a:pPr algn="ctr">
               <a:lnSpc>
@@ -2231,13 +2596,13 @@
               </a:lnSpc>
             </a:pPr>
             <a:r>
-              <a:rPr b="0" lang="en-US" sz="4000" spc="-1" strike="noStrike">
-                <a:solidFill>
-                  <a:srgbClr val="1cade4"/>
-                </a:solidFill>
-                <a:uFill>
-                  <a:solidFill>
-                    <a:srgbClr val="ffffff"/>
+              <a:rPr lang="en-US" sz="4000" b="0" strike="noStrike" spc="-1">
+                <a:solidFill>
+                  <a:srgbClr val="1CADE4"/>
+                </a:solidFill>
+                <a:uFill>
+                  <a:solidFill>
+                    <a:srgbClr val="FFFFFF"/>
                   </a:solidFill>
                 </a:uFill>
                 <a:latin typeface="Century Gothic"/>
@@ -2245,13 +2610,13 @@
               <a:t>Cider Retrospective</a:t>
             </a:r>
             <a:r>
-              <a:rPr b="0" lang="en-US" sz="900" spc="-1" strike="noStrike">
-                <a:solidFill>
-                  <a:srgbClr val="1cade4"/>
-                </a:solidFill>
-                <a:uFill>
-                  <a:solidFill>
-                    <a:srgbClr val="ffffff"/>
+              <a:rPr lang="en-US" sz="900" b="0" strike="noStrike" spc="-1">
+                <a:solidFill>
+                  <a:srgbClr val="1CADE4"/>
+                </a:solidFill>
+                <a:uFill>
+                  <a:solidFill>
+                    <a:srgbClr val="FFFFFF"/>
                   </a:solidFill>
                 </a:uFill>
                 <a:latin typeface="Century Gothic"/>
@@ -2259,13 +2624,13 @@
               <a:t>
 </a:t>
             </a:r>
-            <a:endParaRPr b="0" lang="en-US" sz="1800" spc="-1" strike="noStrike">
-              <a:solidFill>
-                <a:srgbClr val="000000"/>
-              </a:solidFill>
-              <a:uFill>
-                <a:solidFill>
-                  <a:srgbClr val="ffffff"/>
+            <a:endParaRPr lang="en-US" sz="1800" b="0" strike="noStrike" spc="-1">
+              <a:solidFill>
+                <a:srgbClr val="000000"/>
+              </a:solidFill>
+              <a:uFill>
+                <a:solidFill>
+                  <a:srgbClr val="FFFFFF"/>
                 </a:solidFill>
               </a:uFill>
               <a:latin typeface="Century Gothic"/>
@@ -2294,8 +2659,9 @@
         </p:spPr>
         <p:txBody>
           <a:bodyPr/>
-          <a:p>
-            <a:pPr lvl="1" marL="457200" indent="-182520">
+          <a:lstStyle/>
+          <a:p>
+            <a:pPr marL="457200" lvl="1" indent="-182520">
               <a:lnSpc>
                 <a:spcPct val="100000"/>
               </a:lnSpc>
@@ -2306,33 +2672,33 @@
               <a:buChar char="◦"/>
             </a:pPr>
             <a:r>
-              <a:rPr b="1" lang="en-US" sz="1800" spc="-1" strike="noStrike">
+              <a:rPr lang="en-US" sz="1800" b="1" strike="noStrike" spc="-1">
                 <a:solidFill>
                   <a:srgbClr val="000000"/>
                 </a:solidFill>
                 <a:uFill>
                   <a:solidFill>
-                    <a:srgbClr val="ffffff"/>
+                    <a:srgbClr val="FFFFFF"/>
                   </a:solidFill>
                 </a:uFill>
                 <a:latin typeface="Century Gothic"/>
               </a:rPr>
               <a:t>What Went Well?</a:t>
             </a:r>
-            <a:endParaRPr b="0" lang="en-US" sz="1400" spc="-1" strike="noStrike">
-              <a:solidFill>
-                <a:srgbClr val="000000"/>
-              </a:solidFill>
-              <a:uFill>
-                <a:solidFill>
-                  <a:srgbClr val="ffffff"/>
-                </a:solidFill>
-              </a:uFill>
-              <a:latin typeface="Century Gothic"/>
-            </a:endParaRPr>
-          </a:p>
-          <a:p>
-            <a:pPr lvl="2" marL="731520" indent="-182520">
+            <a:endParaRPr lang="en-US" sz="1400" b="0" strike="noStrike" spc="-1">
+              <a:solidFill>
+                <a:srgbClr val="000000"/>
+              </a:solidFill>
+              <a:uFill>
+                <a:solidFill>
+                  <a:srgbClr val="FFFFFF"/>
+                </a:solidFill>
+              </a:uFill>
+              <a:latin typeface="Century Gothic"/>
+            </a:endParaRPr>
+          </a:p>
+          <a:p>
+            <a:pPr marL="731520" lvl="2" indent="-182520">
               <a:lnSpc>
                 <a:spcPct val="100000"/>
               </a:lnSpc>
@@ -2343,33 +2709,33 @@
               <a:buChar char="◦"/>
             </a:pPr>
             <a:r>
-              <a:rPr b="0" lang="en-US" sz="1600" spc="-1" strike="noStrike">
+              <a:rPr lang="en-US" sz="1600" b="0" strike="noStrike" spc="-1">
                 <a:solidFill>
                   <a:srgbClr val="000000"/>
                 </a:solidFill>
                 <a:uFill>
                   <a:solidFill>
-                    <a:srgbClr val="ffffff"/>
+                    <a:srgbClr val="FFFFFF"/>
                   </a:solidFill>
                 </a:uFill>
                 <a:latin typeface="Century Gothic"/>
               </a:rPr>
               <a:t>Working together on common issues (Travis CI)</a:t>
             </a:r>
-            <a:endParaRPr b="0" lang="en-US" sz="1400" spc="-1" strike="noStrike">
-              <a:solidFill>
-                <a:srgbClr val="000000"/>
-              </a:solidFill>
-              <a:uFill>
-                <a:solidFill>
-                  <a:srgbClr val="ffffff"/>
-                </a:solidFill>
-              </a:uFill>
-              <a:latin typeface="Century Gothic"/>
-            </a:endParaRPr>
-          </a:p>
-          <a:p>
-            <a:pPr lvl="2" marL="731520" indent="-182520">
+            <a:endParaRPr lang="en-US" sz="1400" b="0" strike="noStrike" spc="-1">
+              <a:solidFill>
+                <a:srgbClr val="000000"/>
+              </a:solidFill>
+              <a:uFill>
+                <a:solidFill>
+                  <a:srgbClr val="FFFFFF"/>
+                </a:solidFill>
+              </a:uFill>
+              <a:latin typeface="Century Gothic"/>
+            </a:endParaRPr>
+          </a:p>
+          <a:p>
+            <a:pPr marL="731520" lvl="2" indent="-182520">
               <a:lnSpc>
                 <a:spcPct val="100000"/>
               </a:lnSpc>
@@ -2380,33 +2746,33 @@
               <a:buChar char="◦"/>
             </a:pPr>
             <a:r>
-              <a:rPr b="0" lang="en-US" sz="1600" spc="-1" strike="noStrike">
+              <a:rPr lang="en-US" sz="1600" b="0" strike="noStrike" spc="-1">
                 <a:solidFill>
                   <a:srgbClr val="000000"/>
                 </a:solidFill>
                 <a:uFill>
                   <a:solidFill>
-                    <a:srgbClr val="ffffff"/>
+                    <a:srgbClr val="FFFFFF"/>
                   </a:solidFill>
                 </a:uFill>
                 <a:latin typeface="Century Gothic"/>
               </a:rPr>
               <a:t>Focusing on top priority issues (Travis CI)</a:t>
             </a:r>
-            <a:endParaRPr b="0" lang="en-US" sz="1400" spc="-1" strike="noStrike">
-              <a:solidFill>
-                <a:srgbClr val="000000"/>
-              </a:solidFill>
-              <a:uFill>
-                <a:solidFill>
-                  <a:srgbClr val="ffffff"/>
-                </a:solidFill>
-              </a:uFill>
-              <a:latin typeface="Century Gothic"/>
-            </a:endParaRPr>
-          </a:p>
-          <a:p>
-            <a:pPr lvl="1" marL="457200" indent="-182520">
+            <a:endParaRPr lang="en-US" sz="1400" b="0" strike="noStrike" spc="-1">
+              <a:solidFill>
+                <a:srgbClr val="000000"/>
+              </a:solidFill>
+              <a:uFill>
+                <a:solidFill>
+                  <a:srgbClr val="FFFFFF"/>
+                </a:solidFill>
+              </a:uFill>
+              <a:latin typeface="Century Gothic"/>
+            </a:endParaRPr>
+          </a:p>
+          <a:p>
+            <a:pPr marL="457200" lvl="1" indent="-182520">
               <a:lnSpc>
                 <a:spcPct val="100000"/>
               </a:lnSpc>
@@ -2417,33 +2783,33 @@
               <a:buChar char="◦"/>
             </a:pPr>
             <a:r>
-              <a:rPr b="1" lang="en-US" sz="1800" spc="-1" strike="noStrike">
+              <a:rPr lang="en-US" sz="1800" b="1" strike="noStrike" spc="-1">
                 <a:solidFill>
                   <a:srgbClr val="000000"/>
                 </a:solidFill>
                 <a:uFill>
                   <a:solidFill>
-                    <a:srgbClr val="ffffff"/>
+                    <a:srgbClr val="FFFFFF"/>
                   </a:solidFill>
                 </a:uFill>
                 <a:latin typeface="Century Gothic"/>
               </a:rPr>
               <a:t>What Can We do to Improve?</a:t>
             </a:r>
-            <a:endParaRPr b="0" lang="en-US" sz="1400" spc="-1" strike="noStrike">
-              <a:solidFill>
-                <a:srgbClr val="000000"/>
-              </a:solidFill>
-              <a:uFill>
-                <a:solidFill>
-                  <a:srgbClr val="ffffff"/>
-                </a:solidFill>
-              </a:uFill>
-              <a:latin typeface="Century Gothic"/>
-            </a:endParaRPr>
-          </a:p>
-          <a:p>
-            <a:pPr lvl="2" marL="731520" indent="-182520">
+            <a:endParaRPr lang="en-US" sz="1400" b="0" strike="noStrike" spc="-1">
+              <a:solidFill>
+                <a:srgbClr val="000000"/>
+              </a:solidFill>
+              <a:uFill>
+                <a:solidFill>
+                  <a:srgbClr val="FFFFFF"/>
+                </a:solidFill>
+              </a:uFill>
+              <a:latin typeface="Century Gothic"/>
+            </a:endParaRPr>
+          </a:p>
+          <a:p>
+            <a:pPr marL="731520" lvl="2" indent="-182520">
               <a:lnSpc>
                 <a:spcPct val="100000"/>
               </a:lnSpc>
@@ -2454,33 +2820,33 @@
               <a:buChar char="◦"/>
             </a:pPr>
             <a:r>
-              <a:rPr b="0" lang="en-US" sz="1600" spc="-1" strike="noStrike">
+              <a:rPr lang="en-US" sz="1600" b="0" strike="noStrike" spc="-1">
                 <a:solidFill>
                   <a:srgbClr val="000000"/>
                 </a:solidFill>
                 <a:uFill>
                   <a:solidFill>
-                    <a:srgbClr val="ffffff"/>
+                    <a:srgbClr val="FFFFFF"/>
                   </a:solidFill>
                 </a:uFill>
                 <a:latin typeface="Century Gothic"/>
               </a:rPr>
               <a:t>Work face-to-face more often</a:t>
             </a:r>
-            <a:endParaRPr b="0" lang="en-US" sz="1400" spc="-1" strike="noStrike">
-              <a:solidFill>
-                <a:srgbClr val="000000"/>
-              </a:solidFill>
-              <a:uFill>
-                <a:solidFill>
-                  <a:srgbClr val="ffffff"/>
-                </a:solidFill>
-              </a:uFill>
-              <a:latin typeface="Century Gothic"/>
-            </a:endParaRPr>
-          </a:p>
-          <a:p>
-            <a:pPr lvl="2" marL="731520" indent="-182520">
+            <a:endParaRPr lang="en-US" sz="1400" b="0" strike="noStrike" spc="-1">
+              <a:solidFill>
+                <a:srgbClr val="000000"/>
+              </a:solidFill>
+              <a:uFill>
+                <a:solidFill>
+                  <a:srgbClr val="FFFFFF"/>
+                </a:solidFill>
+              </a:uFill>
+              <a:latin typeface="Century Gothic"/>
+            </a:endParaRPr>
+          </a:p>
+          <a:p>
+            <a:pPr marL="731520" lvl="2" indent="-182520">
               <a:lnSpc>
                 <a:spcPct val="100000"/>
               </a:lnSpc>
@@ -2491,33 +2857,33 @@
               <a:buChar char="◦"/>
             </a:pPr>
             <a:r>
-              <a:rPr b="0" lang="en-US" sz="1600" spc="-1" strike="noStrike">
+              <a:rPr lang="en-US" sz="1600" b="0" strike="noStrike" spc="-1">
                 <a:solidFill>
                   <a:srgbClr val="000000"/>
                 </a:solidFill>
                 <a:uFill>
                   <a:solidFill>
-                    <a:srgbClr val="ffffff"/>
+                    <a:srgbClr val="FFFFFF"/>
                   </a:solidFill>
                 </a:uFill>
                 <a:latin typeface="Century Gothic"/>
               </a:rPr>
               <a:t>Choose a project that better suits the individual skills of the team members</a:t>
             </a:r>
-            <a:endParaRPr b="0" lang="en-US" sz="1400" spc="-1" strike="noStrike">
-              <a:solidFill>
-                <a:srgbClr val="000000"/>
-              </a:solidFill>
-              <a:uFill>
-                <a:solidFill>
-                  <a:srgbClr val="ffffff"/>
-                </a:solidFill>
-              </a:uFill>
-              <a:latin typeface="Century Gothic"/>
-            </a:endParaRPr>
-          </a:p>
-          <a:p>
-            <a:pPr lvl="1" marL="457200" indent="-182520">
+            <a:endParaRPr lang="en-US" sz="1400" b="0" strike="noStrike" spc="-1">
+              <a:solidFill>
+                <a:srgbClr val="000000"/>
+              </a:solidFill>
+              <a:uFill>
+                <a:solidFill>
+                  <a:srgbClr val="FFFFFF"/>
+                </a:solidFill>
+              </a:uFill>
+              <a:latin typeface="Century Gothic"/>
+            </a:endParaRPr>
+          </a:p>
+          <a:p>
+            <a:pPr marL="457200" lvl="1" indent="-182520">
               <a:lnSpc>
                 <a:spcPct val="100000"/>
               </a:lnSpc>
@@ -2528,33 +2894,33 @@
               <a:buChar char="◦"/>
             </a:pPr>
             <a:r>
-              <a:rPr b="1" lang="en-US" sz="1800" spc="-1" strike="noStrike">
+              <a:rPr lang="en-US" sz="1800" b="1" strike="noStrike" spc="-1">
                 <a:solidFill>
                   <a:srgbClr val="000000"/>
                 </a:solidFill>
                 <a:uFill>
                   <a:solidFill>
-                    <a:srgbClr val="ffffff"/>
+                    <a:srgbClr val="FFFFFF"/>
                   </a:solidFill>
                 </a:uFill>
                 <a:latin typeface="Century Gothic"/>
               </a:rPr>
               <a:t>What Might Be Impeding Us from Performing Better?</a:t>
             </a:r>
-            <a:endParaRPr b="0" lang="en-US" sz="1400" spc="-1" strike="noStrike">
-              <a:solidFill>
-                <a:srgbClr val="000000"/>
-              </a:solidFill>
-              <a:uFill>
-                <a:solidFill>
-                  <a:srgbClr val="ffffff"/>
-                </a:solidFill>
-              </a:uFill>
-              <a:latin typeface="Century Gothic"/>
-            </a:endParaRPr>
-          </a:p>
-          <a:p>
-            <a:pPr lvl="2" marL="731520" indent="-182520">
+            <a:endParaRPr lang="en-US" sz="1400" b="0" strike="noStrike" spc="-1">
+              <a:solidFill>
+                <a:srgbClr val="000000"/>
+              </a:solidFill>
+              <a:uFill>
+                <a:solidFill>
+                  <a:srgbClr val="FFFFFF"/>
+                </a:solidFill>
+              </a:uFill>
+              <a:latin typeface="Century Gothic"/>
+            </a:endParaRPr>
+          </a:p>
+          <a:p>
+            <a:pPr marL="731520" lvl="2" indent="-182520">
               <a:lnSpc>
                 <a:spcPct val="100000"/>
               </a:lnSpc>
@@ -2565,33 +2931,33 @@
               <a:buChar char="◦"/>
             </a:pPr>
             <a:r>
-              <a:rPr b="0" lang="en-US" sz="1600" spc="-1" strike="noStrike">
+              <a:rPr lang="en-US" sz="1600" b="0" strike="noStrike" spc="-1">
                 <a:solidFill>
                   <a:srgbClr val="000000"/>
                 </a:solidFill>
                 <a:uFill>
                   <a:solidFill>
-                    <a:srgbClr val="ffffff"/>
+                    <a:srgbClr val="FFFFFF"/>
                   </a:solidFill>
                 </a:uFill>
                 <a:latin typeface="Century Gothic"/>
               </a:rPr>
               <a:t>Lack of experience with Android development and hard-to-find or outdated/unsupported learning resources</a:t>
             </a:r>
-            <a:endParaRPr b="0" lang="en-US" sz="1400" spc="-1" strike="noStrike">
-              <a:solidFill>
-                <a:srgbClr val="000000"/>
-              </a:solidFill>
-              <a:uFill>
-                <a:solidFill>
-                  <a:srgbClr val="ffffff"/>
-                </a:solidFill>
-              </a:uFill>
-              <a:latin typeface="Century Gothic"/>
-            </a:endParaRPr>
-          </a:p>
-          <a:p>
-            <a:pPr lvl="2" marL="731520" indent="-182520">
+            <a:endParaRPr lang="en-US" sz="1400" b="0" strike="noStrike" spc="-1">
+              <a:solidFill>
+                <a:srgbClr val="000000"/>
+              </a:solidFill>
+              <a:uFill>
+                <a:solidFill>
+                  <a:srgbClr val="FFFFFF"/>
+                </a:solidFill>
+              </a:uFill>
+              <a:latin typeface="Century Gothic"/>
+            </a:endParaRPr>
+          </a:p>
+          <a:p>
+            <a:pPr marL="731520" lvl="2" indent="-182520">
               <a:lnSpc>
                 <a:spcPct val="100000"/>
               </a:lnSpc>
@@ -2602,104 +2968,104 @@
               <a:buChar char="◦"/>
             </a:pPr>
             <a:r>
-              <a:rPr b="0" lang="en-US" sz="1600" spc="-1" strike="noStrike">
+              <a:rPr lang="en-US" sz="1600" b="0" strike="noStrike" spc="-1">
                 <a:solidFill>
                   <a:srgbClr val="000000"/>
                 </a:solidFill>
                 <a:uFill>
                   <a:solidFill>
-                    <a:srgbClr val="ffffff"/>
+                    <a:srgbClr val="FFFFFF"/>
                   </a:solidFill>
                 </a:uFill>
                 <a:latin typeface="Century Gothic"/>
               </a:rPr>
               <a:t>Developing software in three different environments</a:t>
             </a:r>
-            <a:endParaRPr b="0" lang="en-US" sz="1400" spc="-1" strike="noStrike">
-              <a:solidFill>
-                <a:srgbClr val="000000"/>
-              </a:solidFill>
-              <a:uFill>
-                <a:solidFill>
-                  <a:srgbClr val="ffffff"/>
-                </a:solidFill>
-              </a:uFill>
-              <a:latin typeface="Century Gothic"/>
-            </a:endParaRPr>
-          </a:p>
-          <a:p>
-            <a:endParaRPr b="0" lang="en-US" sz="1800" spc="-1" strike="noStrike">
-              <a:solidFill>
-                <a:srgbClr val="000000"/>
-              </a:solidFill>
-              <a:uFill>
-                <a:solidFill>
-                  <a:srgbClr val="ffffff"/>
-                </a:solidFill>
-              </a:uFill>
-              <a:latin typeface="Century Gothic"/>
-            </a:endParaRPr>
-          </a:p>
-          <a:p>
-            <a:endParaRPr b="0" lang="en-US" sz="1800" spc="-1" strike="noStrike">
-              <a:solidFill>
-                <a:srgbClr val="000000"/>
-              </a:solidFill>
-              <a:uFill>
-                <a:solidFill>
-                  <a:srgbClr val="ffffff"/>
-                </a:solidFill>
-              </a:uFill>
-              <a:latin typeface="Century Gothic"/>
-            </a:endParaRPr>
-          </a:p>
-          <a:p>
-            <a:endParaRPr b="0" lang="en-US" sz="1800" spc="-1" strike="noStrike">
-              <a:solidFill>
-                <a:srgbClr val="000000"/>
-              </a:solidFill>
-              <a:uFill>
-                <a:solidFill>
-                  <a:srgbClr val="ffffff"/>
-                </a:solidFill>
-              </a:uFill>
-              <a:latin typeface="Century Gothic"/>
-            </a:endParaRPr>
-          </a:p>
-          <a:p>
-            <a:endParaRPr b="0" lang="en-US" sz="1800" spc="-1" strike="noStrike">
-              <a:solidFill>
-                <a:srgbClr val="000000"/>
-              </a:solidFill>
-              <a:uFill>
-                <a:solidFill>
-                  <a:srgbClr val="ffffff"/>
-                </a:solidFill>
-              </a:uFill>
-              <a:latin typeface="Century Gothic"/>
-            </a:endParaRPr>
-          </a:p>
-          <a:p>
-            <a:endParaRPr b="0" lang="en-US" sz="1800" spc="-1" strike="noStrike">
-              <a:solidFill>
-                <a:srgbClr val="000000"/>
-              </a:solidFill>
-              <a:uFill>
-                <a:solidFill>
-                  <a:srgbClr val="ffffff"/>
-                </a:solidFill>
-              </a:uFill>
-              <a:latin typeface="Century Gothic"/>
-            </a:endParaRPr>
-          </a:p>
-          <a:p>
-            <a:endParaRPr b="0" lang="en-US" sz="1800" spc="-1" strike="noStrike">
-              <a:solidFill>
-                <a:srgbClr val="000000"/>
-              </a:solidFill>
-              <a:uFill>
-                <a:solidFill>
-                  <a:srgbClr val="ffffff"/>
+            <a:endParaRPr lang="en-US" sz="1400" b="0" strike="noStrike" spc="-1">
+              <a:solidFill>
+                <a:srgbClr val="000000"/>
+              </a:solidFill>
+              <a:uFill>
+                <a:solidFill>
+                  <a:srgbClr val="FFFFFF"/>
+                </a:solidFill>
+              </a:uFill>
+              <a:latin typeface="Century Gothic"/>
+            </a:endParaRPr>
+          </a:p>
+          <a:p>
+            <a:endParaRPr lang="en-US" sz="1800" b="0" strike="noStrike" spc="-1">
+              <a:solidFill>
+                <a:srgbClr val="000000"/>
+              </a:solidFill>
+              <a:uFill>
+                <a:solidFill>
+                  <a:srgbClr val="FFFFFF"/>
+                </a:solidFill>
+              </a:uFill>
+              <a:latin typeface="Century Gothic"/>
+            </a:endParaRPr>
+          </a:p>
+          <a:p>
+            <a:endParaRPr lang="en-US" sz="1800" b="0" strike="noStrike" spc="-1">
+              <a:solidFill>
+                <a:srgbClr val="000000"/>
+              </a:solidFill>
+              <a:uFill>
+                <a:solidFill>
+                  <a:srgbClr val="FFFFFF"/>
+                </a:solidFill>
+              </a:uFill>
+              <a:latin typeface="Century Gothic"/>
+            </a:endParaRPr>
+          </a:p>
+          <a:p>
+            <a:endParaRPr lang="en-US" sz="1800" b="0" strike="noStrike" spc="-1">
+              <a:solidFill>
+                <a:srgbClr val="000000"/>
+              </a:solidFill>
+              <a:uFill>
+                <a:solidFill>
+                  <a:srgbClr val="FFFFFF"/>
+                </a:solidFill>
+              </a:uFill>
+              <a:latin typeface="Century Gothic"/>
+            </a:endParaRPr>
+          </a:p>
+          <a:p>
+            <a:endParaRPr lang="en-US" sz="1800" b="0" strike="noStrike" spc="-1">
+              <a:solidFill>
+                <a:srgbClr val="000000"/>
+              </a:solidFill>
+              <a:uFill>
+                <a:solidFill>
+                  <a:srgbClr val="FFFFFF"/>
+                </a:solidFill>
+              </a:uFill>
+              <a:latin typeface="Century Gothic"/>
+            </a:endParaRPr>
+          </a:p>
+          <a:p>
+            <a:endParaRPr lang="en-US" sz="1800" b="0" strike="noStrike" spc="-1">
+              <a:solidFill>
+                <a:srgbClr val="000000"/>
+              </a:solidFill>
+              <a:uFill>
+                <a:solidFill>
+                  <a:srgbClr val="FFFFFF"/>
+                </a:solidFill>
+              </a:uFill>
+              <a:latin typeface="Century Gothic"/>
+            </a:endParaRPr>
+          </a:p>
+          <a:p>
+            <a:endParaRPr lang="en-US" sz="1800" b="0" strike="noStrike" spc="-1">
+              <a:solidFill>
+                <a:srgbClr val="000000"/>
+              </a:solidFill>
+              <a:uFill>
+                <a:solidFill>
+                  <a:srgbClr val="FFFFFF"/>
                 </a:solidFill>
               </a:uFill>
               <a:latin typeface="Century Gothic"/>
@@ -2711,13 +3077,13 @@
                 <a:spcPct val="100000"/>
               </a:lnSpc>
             </a:pPr>
-            <a:endParaRPr b="0" lang="en-US" sz="1800" spc="-1" strike="noStrike">
-              <a:solidFill>
-                <a:srgbClr val="000000"/>
-              </a:solidFill>
-              <a:uFill>
-                <a:solidFill>
-                  <a:srgbClr val="ffffff"/>
+            <a:endParaRPr lang="en-US" sz="1800" b="0" strike="noStrike" spc="-1">
+              <a:solidFill>
+                <a:srgbClr val="000000"/>
+              </a:solidFill>
+              <a:uFill>
+                <a:solidFill>
+                  <a:srgbClr val="FFFFFF"/>
                 </a:solidFill>
               </a:uFill>
               <a:latin typeface="Century Gothic"/>
@@ -2727,6 +3093,9 @@
       </p:sp>
     </p:spTree>
   </p:cSld>
+  <p:clrMapOvr>
+    <a:masterClrMapping/>
+  </p:clrMapOvr>
   <p:timing>
     <p:tnLst>
       <p:par>
@@ -2735,14 +3104,14 @@
             <p:seq>
               <p:cTn id="2" nodeType="mainSeq"/>
               <p:prevCondLst>
-                <p:cond delay="0" evt="onPrev">
+                <p:cond evt="onPrev" delay="0">
                   <p:tgtEl>
                     <p:sldTgt/>
                   </p:tgtEl>
                 </p:cond>
               </p:prevCondLst>
               <p:nextCondLst>
-                <p:cond delay="0" evt="onNext">
+                <p:cond evt="onNext" delay="0">
                   <p:tgtEl>
                     <p:sldTgt/>
                   </p:tgtEl>
@@ -2758,7 +3127,7 @@
 </file>
 
 <file path=ppt/slides/slide2.xml><?xml version="1.0" encoding="utf-8"?>
-<p:sld xmlns:a="http://schemas.openxmlformats.org/drawingml/2006/main" xmlns:p="http://schemas.openxmlformats.org/presentationml/2006/main" xmlns:r="http://schemas.openxmlformats.org/officeDocument/2006/relationships" xmlns:p14="http://schemas.microsoft.com/office/powerpoint/2010/main" xmlns:p15="http://schemas.microsoft.com/office/powerpoint/2012/main" xmlns:mc="http://schemas.openxmlformats.org/markup-compatibility/2006">
+<p:sld xmlns:a="http://schemas.openxmlformats.org/drawingml/2006/main" xmlns:r="http://schemas.openxmlformats.org/officeDocument/2006/relationships" xmlns:p="http://schemas.openxmlformats.org/presentationml/2006/main">
   <p:cSld>
     <p:spTree>
       <p:nvGrpSpPr>
@@ -2795,6 +3164,7 @@
         </p:spPr>
         <p:txBody>
           <a:bodyPr anchor="ctr"/>
+          <a:lstStyle/>
           <a:p>
             <a:pPr algn="ctr">
               <a:lnSpc>
@@ -2802,26 +3172,26 @@
               </a:lnSpc>
             </a:pPr>
             <a:r>
-              <a:rPr b="0" lang="en-US" sz="4000" spc="-1" strike="noStrike">
-                <a:solidFill>
-                  <a:srgbClr val="1cade4"/>
-                </a:solidFill>
-                <a:uFill>
-                  <a:solidFill>
-                    <a:srgbClr val="ffffff"/>
+              <a:rPr lang="en-US" sz="4000" b="0" strike="noStrike" spc="-1">
+                <a:solidFill>
+                  <a:srgbClr val="1CADE4"/>
+                </a:solidFill>
+                <a:uFill>
+                  <a:solidFill>
+                    <a:srgbClr val="FFFFFF"/>
                   </a:solidFill>
                 </a:uFill>
                 <a:latin typeface="Century Gothic"/>
               </a:rPr>
               <a:t>Cider Retrospective</a:t>
             </a:r>
-            <a:endParaRPr b="0" lang="en-US" sz="1800" spc="-1" strike="noStrike">
-              <a:solidFill>
-                <a:srgbClr val="000000"/>
-              </a:solidFill>
-              <a:uFill>
-                <a:solidFill>
-                  <a:srgbClr val="ffffff"/>
+            <a:endParaRPr lang="en-US" sz="1800" b="0" strike="noStrike" spc="-1">
+              <a:solidFill>
+                <a:srgbClr val="000000"/>
+              </a:solidFill>
+              <a:uFill>
+                <a:solidFill>
+                  <a:srgbClr val="FFFFFF"/>
                 </a:solidFill>
               </a:uFill>
               <a:latin typeface="Century Gothic"/>
@@ -2850,8 +3220,9 @@
         </p:spPr>
         <p:txBody>
           <a:bodyPr/>
-          <a:p>
-            <a:pPr lvl="1" marL="457200" indent="-182520">
+          <a:lstStyle/>
+          <a:p>
+            <a:pPr marL="457200" lvl="1" indent="-182520">
               <a:lnSpc>
                 <a:spcPct val="100000"/>
               </a:lnSpc>
@@ -2862,13 +3233,13 @@
               <a:buChar char="◦"/>
             </a:pPr>
             <a:r>
-              <a:rPr b="1" lang="en-US" sz="1800" spc="-1" strike="noStrike">
+              <a:rPr lang="en-US" sz="1800" b="1" strike="noStrike" spc="-1" dirty="0">
                 <a:solidFill>
                   <a:srgbClr val="000000"/>
                 </a:solidFill>
                 <a:uFill>
                   <a:solidFill>
-                    <a:srgbClr val="ffffff"/>
+                    <a:srgbClr val="FFFFFF"/>
                   </a:solidFill>
                 </a:uFill>
                 <a:latin typeface="Century Gothic"/>
@@ -2876,33 +3247,33 @@
               <a:t>What Can I do to Improve</a:t>
             </a:r>
             <a:r>
-              <a:rPr b="0" lang="en-US" sz="1600" spc="-1" strike="noStrike">
+              <a:rPr lang="en-US" sz="1600" b="0" strike="noStrike" spc="-1" dirty="0">
                 <a:solidFill>
                   <a:srgbClr val="000000"/>
                 </a:solidFill>
                 <a:uFill>
                   <a:solidFill>
-                    <a:srgbClr val="ffffff"/>
+                    <a:srgbClr val="FFFFFF"/>
                   </a:solidFill>
                 </a:uFill>
                 <a:latin typeface="Century Gothic"/>
               </a:rPr>
               <a:t>?</a:t>
             </a:r>
-            <a:endParaRPr b="0" lang="en-US" sz="1400" spc="-1" strike="noStrike">
-              <a:solidFill>
-                <a:srgbClr val="000000"/>
-              </a:solidFill>
-              <a:uFill>
-                <a:solidFill>
-                  <a:srgbClr val="ffffff"/>
-                </a:solidFill>
-              </a:uFill>
-              <a:latin typeface="Century Gothic"/>
-            </a:endParaRPr>
-          </a:p>
-          <a:p>
-            <a:pPr lvl="3" marL="1005840" indent="-182520">
+            <a:endParaRPr lang="en-US" sz="1400" b="0" strike="noStrike" spc="-1" dirty="0">
+              <a:solidFill>
+                <a:srgbClr val="000000"/>
+              </a:solidFill>
+              <a:uFill>
+                <a:solidFill>
+                  <a:srgbClr val="FFFFFF"/>
+                </a:solidFill>
+              </a:uFill>
+              <a:latin typeface="Century Gothic"/>
+            </a:endParaRPr>
+          </a:p>
+          <a:p>
+            <a:pPr marL="1005840" lvl="3" indent="-182520">
               <a:lnSpc>
                 <a:spcPct val="100000"/>
               </a:lnSpc>
@@ -2913,33 +3284,33 @@
               <a:buChar char="◦"/>
             </a:pPr>
             <a:r>
-              <a:rPr b="0" lang="en-US" sz="1600" spc="-1" strike="noStrike">
+              <a:rPr lang="en-US" sz="1600" b="0" strike="noStrike" spc="-1" dirty="0">
                 <a:solidFill>
                   <a:srgbClr val="000000"/>
                 </a:solidFill>
                 <a:uFill>
                   <a:solidFill>
-                    <a:srgbClr val="ffffff"/>
+                    <a:srgbClr val="FFFFFF"/>
                   </a:solidFill>
                 </a:uFill>
                 <a:latin typeface="Century Gothic"/>
               </a:rPr>
               <a:t>Sherman</a:t>
             </a:r>
-            <a:endParaRPr b="0" lang="en-US" sz="1400" spc="-1" strike="noStrike">
-              <a:solidFill>
-                <a:srgbClr val="000000"/>
-              </a:solidFill>
-              <a:uFill>
-                <a:solidFill>
-                  <a:srgbClr val="ffffff"/>
-                </a:solidFill>
-              </a:uFill>
-              <a:latin typeface="Century Gothic"/>
-            </a:endParaRPr>
-          </a:p>
-          <a:p>
-            <a:pPr lvl="4" marL="1598400" indent="-342720">
+            <a:endParaRPr lang="en-US" sz="1400" b="0" strike="noStrike" spc="-1" dirty="0">
+              <a:solidFill>
+                <a:srgbClr val="000000"/>
+              </a:solidFill>
+              <a:uFill>
+                <a:solidFill>
+                  <a:srgbClr val="FFFFFF"/>
+                </a:solidFill>
+              </a:uFill>
+              <a:latin typeface="Century Gothic"/>
+            </a:endParaRPr>
+          </a:p>
+          <a:p>
+            <a:pPr marL="1598400" lvl="4" indent="-342720">
               <a:lnSpc>
                 <a:spcPct val="100000"/>
               </a:lnSpc>
@@ -2950,33 +3321,33 @@
               <a:buAutoNum type="arabicPeriod"/>
             </a:pPr>
             <a:r>
-              <a:rPr b="0" lang="en-US" sz="1400" spc="-1" strike="noStrike">
+              <a:rPr lang="en-US" sz="1400" b="0" strike="noStrike" spc="-1" dirty="0">
                 <a:solidFill>
                   <a:srgbClr val="000000"/>
                 </a:solidFill>
                 <a:uFill>
                   <a:solidFill>
-                    <a:srgbClr val="ffffff"/>
+                    <a:srgbClr val="FFFFFF"/>
                   </a:solidFill>
                 </a:uFill>
                 <a:latin typeface="Century Gothic"/>
               </a:rPr>
               <a:t>Be more assertive when communicating with team members.</a:t>
             </a:r>
-            <a:endParaRPr b="0" lang="en-US" sz="2000" spc="-1" strike="noStrike">
-              <a:solidFill>
-                <a:srgbClr val="000000"/>
-              </a:solidFill>
-              <a:uFill>
-                <a:solidFill>
-                  <a:srgbClr val="ffffff"/>
-                </a:solidFill>
-              </a:uFill>
-              <a:latin typeface="Century Gothic"/>
-            </a:endParaRPr>
-          </a:p>
-          <a:p>
-            <a:pPr lvl="4" marL="1598400" indent="-342720">
+            <a:endParaRPr lang="en-US" sz="2000" b="0" strike="noStrike" spc="-1" dirty="0">
+              <a:solidFill>
+                <a:srgbClr val="000000"/>
+              </a:solidFill>
+              <a:uFill>
+                <a:solidFill>
+                  <a:srgbClr val="FFFFFF"/>
+                </a:solidFill>
+              </a:uFill>
+              <a:latin typeface="Century Gothic"/>
+            </a:endParaRPr>
+          </a:p>
+          <a:p>
+            <a:pPr marL="1598400" lvl="4" indent="-342720">
               <a:lnSpc>
                 <a:spcPct val="100000"/>
               </a:lnSpc>
@@ -2987,46 +3358,46 @@
               <a:buAutoNum type="arabicPeriod"/>
             </a:pPr>
             <a:r>
-              <a:rPr b="0" lang="en-US" sz="1400" spc="-1" strike="noStrike">
+              <a:rPr lang="en-US" sz="1400" b="0" strike="noStrike" spc="-1" dirty="0">
                 <a:solidFill>
                   <a:srgbClr val="000000"/>
                 </a:solidFill>
                 <a:uFill>
                   <a:solidFill>
-                    <a:srgbClr val="ffffff"/>
+                    <a:srgbClr val="FFFFFF"/>
                   </a:solidFill>
                 </a:uFill>
                 <a:latin typeface="Century Gothic"/>
               </a:rPr>
               <a:t>Ask team members for updates more frequently when they are working on something directly related to my tasks/issues.</a:t>
             </a:r>
-            <a:endParaRPr b="0" lang="en-US" sz="2000" spc="-1" strike="noStrike">
-              <a:solidFill>
-                <a:srgbClr val="000000"/>
-              </a:solidFill>
-              <a:uFill>
-                <a:solidFill>
-                  <a:srgbClr val="ffffff"/>
-                </a:solidFill>
-              </a:uFill>
-              <a:latin typeface="Century Gothic"/>
-            </a:endParaRPr>
-          </a:p>
-          <a:p>
-            <a:endParaRPr b="0" lang="en-US" sz="1800" spc="-1" strike="noStrike">
-              <a:solidFill>
-                <a:srgbClr val="000000"/>
-              </a:solidFill>
-              <a:uFill>
-                <a:solidFill>
-                  <a:srgbClr val="ffffff"/>
-                </a:solidFill>
-              </a:uFill>
-              <a:latin typeface="Century Gothic"/>
-            </a:endParaRPr>
-          </a:p>
-          <a:p>
-            <a:pPr lvl="3" marL="1005840" indent="-182520">
+            <a:endParaRPr lang="en-US" sz="2000" b="0" strike="noStrike" spc="-1" dirty="0">
+              <a:solidFill>
+                <a:srgbClr val="000000"/>
+              </a:solidFill>
+              <a:uFill>
+                <a:solidFill>
+                  <a:srgbClr val="FFFFFF"/>
+                </a:solidFill>
+              </a:uFill>
+              <a:latin typeface="Century Gothic"/>
+            </a:endParaRPr>
+          </a:p>
+          <a:p>
+            <a:endParaRPr lang="en-US" sz="1800" b="0" strike="noStrike" spc="-1" dirty="0">
+              <a:solidFill>
+                <a:srgbClr val="000000"/>
+              </a:solidFill>
+              <a:uFill>
+                <a:solidFill>
+                  <a:srgbClr val="FFFFFF"/>
+                </a:solidFill>
+              </a:uFill>
+              <a:latin typeface="Century Gothic"/>
+            </a:endParaRPr>
+          </a:p>
+          <a:p>
+            <a:pPr marL="1005840" lvl="3" indent="-182520">
               <a:lnSpc>
                 <a:spcPct val="100000"/>
               </a:lnSpc>
@@ -3037,33 +3408,33 @@
               <a:buChar char="◦"/>
             </a:pPr>
             <a:r>
-              <a:rPr b="0" lang="en-US" sz="1600" spc="-1" strike="noStrike">
+              <a:rPr lang="en-US" sz="1600" b="0" strike="noStrike" spc="-1" dirty="0">
                 <a:solidFill>
                   <a:srgbClr val="000000"/>
                 </a:solidFill>
                 <a:uFill>
                   <a:solidFill>
-                    <a:srgbClr val="ffffff"/>
+                    <a:srgbClr val="FFFFFF"/>
                   </a:solidFill>
                 </a:uFill>
                 <a:latin typeface="Century Gothic"/>
               </a:rPr>
               <a:t>Forrest</a:t>
             </a:r>
-            <a:endParaRPr b="0" lang="en-US" sz="1400" spc="-1" strike="noStrike">
-              <a:solidFill>
-                <a:srgbClr val="000000"/>
-              </a:solidFill>
-              <a:uFill>
-                <a:solidFill>
-                  <a:srgbClr val="ffffff"/>
-                </a:solidFill>
-              </a:uFill>
-              <a:latin typeface="Century Gothic"/>
-            </a:endParaRPr>
-          </a:p>
-          <a:p>
-            <a:pPr lvl="4" marL="1598400" indent="-342720">
+            <a:endParaRPr lang="en-US" sz="1400" b="0" strike="noStrike" spc="-1" dirty="0">
+              <a:solidFill>
+                <a:srgbClr val="000000"/>
+              </a:solidFill>
+              <a:uFill>
+                <a:solidFill>
+                  <a:srgbClr val="FFFFFF"/>
+                </a:solidFill>
+              </a:uFill>
+              <a:latin typeface="Century Gothic"/>
+            </a:endParaRPr>
+          </a:p>
+          <a:p>
+            <a:pPr marL="1598400" lvl="4" indent="-342720">
               <a:lnSpc>
                 <a:spcPct val="100000"/>
               </a:lnSpc>
@@ -3074,33 +3445,33 @@
               <a:buAutoNum type="arabicPeriod"/>
             </a:pPr>
             <a:r>
-              <a:rPr b="0" lang="en-US" sz="1400" spc="-1" strike="noStrike">
+              <a:rPr lang="en-US" sz="1400" spc="-1" dirty="0" smtClean="0">
                 <a:solidFill>
                   <a:srgbClr val="000000"/>
                 </a:solidFill>
                 <a:uFill>
                   <a:solidFill>
-                    <a:srgbClr val="ffffff"/>
-                  </a:solidFill>
-                </a:uFill>
-                <a:latin typeface="Century Gothic"/>
-              </a:rPr>
-              <a:t>Thing 1</a:t>
-            </a:r>
-            <a:endParaRPr b="0" lang="en-US" sz="2000" spc="-1" strike="noStrike">
-              <a:solidFill>
-                <a:srgbClr val="000000"/>
-              </a:solidFill>
-              <a:uFill>
-                <a:solidFill>
-                  <a:srgbClr val="ffffff"/>
-                </a:solidFill>
-              </a:uFill>
-              <a:latin typeface="Century Gothic"/>
-            </a:endParaRPr>
-          </a:p>
-          <a:p>
-            <a:pPr lvl="4" marL="1598400" indent="-342720">
+                    <a:srgbClr val="FFFFFF"/>
+                  </a:solidFill>
+                </a:uFill>
+                <a:latin typeface="Century Gothic"/>
+              </a:rPr>
+              <a:t>Set aside time to work face-to-face with team members on tasks where clear communication is critical.</a:t>
+            </a:r>
+            <a:endParaRPr lang="en-US" sz="2000" b="0" strike="noStrike" spc="-1" dirty="0">
+              <a:solidFill>
+                <a:srgbClr val="000000"/>
+              </a:solidFill>
+              <a:uFill>
+                <a:solidFill>
+                  <a:srgbClr val="FFFFFF"/>
+                </a:solidFill>
+              </a:uFill>
+              <a:latin typeface="Century Gothic"/>
+            </a:endParaRPr>
+          </a:p>
+          <a:p>
+            <a:pPr marL="1598400" lvl="4" indent="-342720">
               <a:lnSpc>
                 <a:spcPct val="100000"/>
               </a:lnSpc>
@@ -3111,46 +3482,60 @@
               <a:buAutoNum type="arabicPeriod"/>
             </a:pPr>
             <a:r>
-              <a:rPr b="0" lang="en-US" sz="1400" spc="-1" strike="noStrike">
+              <a:rPr lang="en-US" sz="1400" spc="-1" dirty="0" smtClean="0">
                 <a:solidFill>
                   <a:srgbClr val="000000"/>
                 </a:solidFill>
                 <a:uFill>
                   <a:solidFill>
-                    <a:srgbClr val="ffffff"/>
-                  </a:solidFill>
-                </a:uFill>
-                <a:latin typeface="Century Gothic"/>
-              </a:rPr>
-              <a:t>Thing 2</a:t>
-            </a:r>
-            <a:endParaRPr b="0" lang="en-US" sz="2000" spc="-1" strike="noStrike">
-              <a:solidFill>
-                <a:srgbClr val="000000"/>
-              </a:solidFill>
-              <a:uFill>
-                <a:solidFill>
-                  <a:srgbClr val="ffffff"/>
-                </a:solidFill>
-              </a:uFill>
-              <a:latin typeface="Century Gothic"/>
-            </a:endParaRPr>
-          </a:p>
-          <a:p>
-            <a:endParaRPr b="0" lang="en-US" sz="1800" spc="-1" strike="noStrike">
-              <a:solidFill>
-                <a:srgbClr val="000000"/>
-              </a:solidFill>
-              <a:uFill>
-                <a:solidFill>
-                  <a:srgbClr val="ffffff"/>
-                </a:solidFill>
-              </a:uFill>
-              <a:latin typeface="Century Gothic"/>
-            </a:endParaRPr>
-          </a:p>
-          <a:p>
-            <a:pPr lvl="3" marL="1005840" indent="-182520">
+                    <a:srgbClr val="FFFFFF"/>
+                  </a:solidFill>
+                </a:uFill>
+                <a:latin typeface="Century Gothic"/>
+              </a:rPr>
+              <a:t>Work in Android SDK on desktop computer—which can handle emulation—instead of on laptop—which can’t </a:t>
+            </a:r>
+            <a:r>
+              <a:rPr lang="en-US" sz="1400" spc="-1" smtClean="0">
+                <a:solidFill>
+                  <a:srgbClr val="000000"/>
+                </a:solidFill>
+                <a:uFill>
+                  <a:solidFill>
+                    <a:srgbClr val="FFFFFF"/>
+                  </a:solidFill>
+                </a:uFill>
+                <a:latin typeface="Century Gothic"/>
+              </a:rPr>
+              <a:t>handle emulation.</a:t>
+            </a:r>
+            <a:endParaRPr lang="en-US" sz="2000" b="0" strike="noStrike" spc="-1" dirty="0">
+              <a:solidFill>
+                <a:srgbClr val="000000"/>
+              </a:solidFill>
+              <a:uFill>
+                <a:solidFill>
+                  <a:srgbClr val="FFFFFF"/>
+                </a:solidFill>
+              </a:uFill>
+              <a:latin typeface="Century Gothic"/>
+            </a:endParaRPr>
+          </a:p>
+          <a:p>
+            <a:endParaRPr lang="en-US" sz="1800" b="0" strike="noStrike" spc="-1" dirty="0">
+              <a:solidFill>
+                <a:srgbClr val="000000"/>
+              </a:solidFill>
+              <a:uFill>
+                <a:solidFill>
+                  <a:srgbClr val="FFFFFF"/>
+                </a:solidFill>
+              </a:uFill>
+              <a:latin typeface="Century Gothic"/>
+            </a:endParaRPr>
+          </a:p>
+          <a:p>
+            <a:pPr marL="1005840" lvl="3" indent="-182520">
               <a:lnSpc>
                 <a:spcPct val="100000"/>
               </a:lnSpc>
@@ -3161,33 +3546,33 @@
               <a:buChar char="◦"/>
             </a:pPr>
             <a:r>
-              <a:rPr b="0" lang="en-US" sz="1600" spc="-1" strike="noStrike">
+              <a:rPr lang="en-US" sz="1600" b="0" strike="noStrike" spc="-1" dirty="0">
                 <a:solidFill>
                   <a:srgbClr val="000000"/>
                 </a:solidFill>
                 <a:uFill>
                   <a:solidFill>
-                    <a:srgbClr val="ffffff"/>
+                    <a:srgbClr val="FFFFFF"/>
                   </a:solidFill>
                 </a:uFill>
                 <a:latin typeface="Century Gothic"/>
               </a:rPr>
               <a:t>Zach</a:t>
             </a:r>
-            <a:endParaRPr b="0" lang="en-US" sz="1400" spc="-1" strike="noStrike">
-              <a:solidFill>
-                <a:srgbClr val="000000"/>
-              </a:solidFill>
-              <a:uFill>
-                <a:solidFill>
-                  <a:srgbClr val="ffffff"/>
-                </a:solidFill>
-              </a:uFill>
-              <a:latin typeface="Century Gothic"/>
-            </a:endParaRPr>
-          </a:p>
-          <a:p>
-            <a:pPr lvl="4" marL="1598400" indent="-342720">
+            <a:endParaRPr lang="en-US" sz="1400" b="0" strike="noStrike" spc="-1" dirty="0">
+              <a:solidFill>
+                <a:srgbClr val="000000"/>
+              </a:solidFill>
+              <a:uFill>
+                <a:solidFill>
+                  <a:srgbClr val="FFFFFF"/>
+                </a:solidFill>
+              </a:uFill>
+              <a:latin typeface="Century Gothic"/>
+            </a:endParaRPr>
+          </a:p>
+          <a:p>
+            <a:pPr marL="1598400" lvl="4" indent="-342720">
               <a:lnSpc>
                 <a:spcPct val="100000"/>
               </a:lnSpc>
@@ -3198,33 +3583,33 @@
               <a:buAutoNum type="arabicPeriod"/>
             </a:pPr>
             <a:r>
-              <a:rPr b="0" lang="en-US" sz="1400" spc="-1" strike="noStrike">
+              <a:rPr lang="en-US" sz="1400" b="0" strike="noStrike" spc="-1" dirty="0">
                 <a:solidFill>
                   <a:srgbClr val="000000"/>
                 </a:solidFill>
                 <a:uFill>
                   <a:solidFill>
-                    <a:srgbClr val="ffffff"/>
+                    <a:srgbClr val="FFFFFF"/>
                   </a:solidFill>
                 </a:uFill>
                 <a:latin typeface="Century Gothic"/>
               </a:rPr>
               <a:t>Thing 1</a:t>
             </a:r>
-            <a:endParaRPr b="0" lang="en-US" sz="2000" spc="-1" strike="noStrike">
-              <a:solidFill>
-                <a:srgbClr val="000000"/>
-              </a:solidFill>
-              <a:uFill>
-                <a:solidFill>
-                  <a:srgbClr val="ffffff"/>
-                </a:solidFill>
-              </a:uFill>
-              <a:latin typeface="Century Gothic"/>
-            </a:endParaRPr>
-          </a:p>
-          <a:p>
-            <a:pPr lvl="4" marL="1598400" indent="-342720">
+            <a:endParaRPr lang="en-US" sz="2000" b="0" strike="noStrike" spc="-1" dirty="0">
+              <a:solidFill>
+                <a:srgbClr val="000000"/>
+              </a:solidFill>
+              <a:uFill>
+                <a:solidFill>
+                  <a:srgbClr val="FFFFFF"/>
+                </a:solidFill>
+              </a:uFill>
+              <a:latin typeface="Century Gothic"/>
+            </a:endParaRPr>
+          </a:p>
+          <a:p>
+            <a:pPr marL="1598400" lvl="4" indent="-342720">
               <a:lnSpc>
                 <a:spcPct val="100000"/>
               </a:lnSpc>
@@ -3235,91 +3620,91 @@
               <a:buAutoNum type="arabicPeriod"/>
             </a:pPr>
             <a:r>
-              <a:rPr b="0" lang="en-US" sz="1400" spc="-1" strike="noStrike">
+              <a:rPr lang="en-US" sz="1400" b="0" strike="noStrike" spc="-1" dirty="0">
                 <a:solidFill>
                   <a:srgbClr val="000000"/>
                 </a:solidFill>
                 <a:uFill>
                   <a:solidFill>
-                    <a:srgbClr val="ffffff"/>
+                    <a:srgbClr val="FFFFFF"/>
                   </a:solidFill>
                 </a:uFill>
                 <a:latin typeface="Century Gothic"/>
               </a:rPr>
               <a:t>Thing 2</a:t>
             </a:r>
-            <a:endParaRPr b="0" lang="en-US" sz="2000" spc="-1" strike="noStrike">
-              <a:solidFill>
-                <a:srgbClr val="000000"/>
-              </a:solidFill>
-              <a:uFill>
-                <a:solidFill>
-                  <a:srgbClr val="ffffff"/>
-                </a:solidFill>
-              </a:uFill>
-              <a:latin typeface="Century Gothic"/>
-            </a:endParaRPr>
-          </a:p>
-          <a:p>
-            <a:endParaRPr b="0" lang="en-US" sz="1800" spc="-1" strike="noStrike">
-              <a:solidFill>
-                <a:srgbClr val="000000"/>
-              </a:solidFill>
-              <a:uFill>
-                <a:solidFill>
-                  <a:srgbClr val="ffffff"/>
-                </a:solidFill>
-              </a:uFill>
-              <a:latin typeface="Century Gothic"/>
-            </a:endParaRPr>
-          </a:p>
-          <a:p>
-            <a:endParaRPr b="0" lang="en-US" sz="1800" spc="-1" strike="noStrike">
-              <a:solidFill>
-                <a:srgbClr val="000000"/>
-              </a:solidFill>
-              <a:uFill>
-                <a:solidFill>
-                  <a:srgbClr val="ffffff"/>
-                </a:solidFill>
-              </a:uFill>
-              <a:latin typeface="Century Gothic"/>
-            </a:endParaRPr>
-          </a:p>
-          <a:p>
-            <a:endParaRPr b="0" lang="en-US" sz="1800" spc="-1" strike="noStrike">
-              <a:solidFill>
-                <a:srgbClr val="000000"/>
-              </a:solidFill>
-              <a:uFill>
-                <a:solidFill>
-                  <a:srgbClr val="ffffff"/>
-                </a:solidFill>
-              </a:uFill>
-              <a:latin typeface="Century Gothic"/>
-            </a:endParaRPr>
-          </a:p>
-          <a:p>
-            <a:endParaRPr b="0" lang="en-US" sz="1800" spc="-1" strike="noStrike">
-              <a:solidFill>
-                <a:srgbClr val="000000"/>
-              </a:solidFill>
-              <a:uFill>
-                <a:solidFill>
-                  <a:srgbClr val="ffffff"/>
-                </a:solidFill>
-              </a:uFill>
-              <a:latin typeface="Century Gothic"/>
-            </a:endParaRPr>
-          </a:p>
-          <a:p>
-            <a:endParaRPr b="0" lang="en-US" sz="1800" spc="-1" strike="noStrike">
-              <a:solidFill>
-                <a:srgbClr val="000000"/>
-              </a:solidFill>
-              <a:uFill>
-                <a:solidFill>
-                  <a:srgbClr val="ffffff"/>
+            <a:endParaRPr lang="en-US" sz="2000" b="0" strike="noStrike" spc="-1" dirty="0">
+              <a:solidFill>
+                <a:srgbClr val="000000"/>
+              </a:solidFill>
+              <a:uFill>
+                <a:solidFill>
+                  <a:srgbClr val="FFFFFF"/>
+                </a:solidFill>
+              </a:uFill>
+              <a:latin typeface="Century Gothic"/>
+            </a:endParaRPr>
+          </a:p>
+          <a:p>
+            <a:endParaRPr lang="en-US" sz="1800" b="0" strike="noStrike" spc="-1" dirty="0">
+              <a:solidFill>
+                <a:srgbClr val="000000"/>
+              </a:solidFill>
+              <a:uFill>
+                <a:solidFill>
+                  <a:srgbClr val="FFFFFF"/>
+                </a:solidFill>
+              </a:uFill>
+              <a:latin typeface="Century Gothic"/>
+            </a:endParaRPr>
+          </a:p>
+          <a:p>
+            <a:endParaRPr lang="en-US" sz="1800" b="0" strike="noStrike" spc="-1" dirty="0">
+              <a:solidFill>
+                <a:srgbClr val="000000"/>
+              </a:solidFill>
+              <a:uFill>
+                <a:solidFill>
+                  <a:srgbClr val="FFFFFF"/>
+                </a:solidFill>
+              </a:uFill>
+              <a:latin typeface="Century Gothic"/>
+            </a:endParaRPr>
+          </a:p>
+          <a:p>
+            <a:endParaRPr lang="en-US" sz="1800" b="0" strike="noStrike" spc="-1" dirty="0">
+              <a:solidFill>
+                <a:srgbClr val="000000"/>
+              </a:solidFill>
+              <a:uFill>
+                <a:solidFill>
+                  <a:srgbClr val="FFFFFF"/>
+                </a:solidFill>
+              </a:uFill>
+              <a:latin typeface="Century Gothic"/>
+            </a:endParaRPr>
+          </a:p>
+          <a:p>
+            <a:endParaRPr lang="en-US" sz="1800" b="0" strike="noStrike" spc="-1" dirty="0">
+              <a:solidFill>
+                <a:srgbClr val="000000"/>
+              </a:solidFill>
+              <a:uFill>
+                <a:solidFill>
+                  <a:srgbClr val="FFFFFF"/>
+                </a:solidFill>
+              </a:uFill>
+              <a:latin typeface="Century Gothic"/>
+            </a:endParaRPr>
+          </a:p>
+          <a:p>
+            <a:endParaRPr lang="en-US" sz="1800" b="0" strike="noStrike" spc="-1" dirty="0">
+              <a:solidFill>
+                <a:srgbClr val="000000"/>
+              </a:solidFill>
+              <a:uFill>
+                <a:solidFill>
+                  <a:srgbClr val="FFFFFF"/>
                 </a:solidFill>
               </a:uFill>
               <a:latin typeface="Century Gothic"/>
@@ -3331,13 +3716,13 @@
                 <a:spcPct val="100000"/>
               </a:lnSpc>
             </a:pPr>
-            <a:endParaRPr b="0" lang="en-US" sz="1800" spc="-1" strike="noStrike">
-              <a:solidFill>
-                <a:srgbClr val="000000"/>
-              </a:solidFill>
-              <a:uFill>
-                <a:solidFill>
-                  <a:srgbClr val="ffffff"/>
+            <a:endParaRPr lang="en-US" sz="1800" b="0" strike="noStrike" spc="-1" dirty="0">
+              <a:solidFill>
+                <a:srgbClr val="000000"/>
+              </a:solidFill>
+              <a:uFill>
+                <a:solidFill>
+                  <a:srgbClr val="FFFFFF"/>
                 </a:solidFill>
               </a:uFill>
               <a:latin typeface="Century Gothic"/>
@@ -3347,22 +3732,25 @@
       </p:sp>
     </p:spTree>
   </p:cSld>
+  <p:clrMapOvr>
+    <a:masterClrMapping/>
+  </p:clrMapOvr>
   <p:timing>
     <p:tnLst>
       <p:par>
-        <p:cTn id="3" dur="indefinite" restart="never" nodeType="tmRoot">
+        <p:cTn id="1" dur="indefinite" restart="never" nodeType="tmRoot">
           <p:childTnLst>
             <p:seq>
-              <p:cTn id="4" nodeType="mainSeq"/>
+              <p:cTn id="2" nodeType="mainSeq"/>
               <p:prevCondLst>
-                <p:cond delay="0" evt="onPrev">
+                <p:cond evt="onPrev" delay="0">
                   <p:tgtEl>
                     <p:sldTgt/>
                   </p:tgtEl>
                 </p:cond>
               </p:prevCondLst>
               <p:nextCondLst>
-                <p:cond delay="0" evt="onNext">
+                <p:cond evt="onNext" delay="0">
                   <p:tgtEl>
                     <p:sldTgt/>
                   </p:tgtEl>
@@ -3378,7 +3766,7 @@
 </file>
 
 <file path=ppt/slides/slide3.xml><?xml version="1.0" encoding="utf-8"?>
-<p:sld xmlns:a="http://schemas.openxmlformats.org/drawingml/2006/main" xmlns:p="http://schemas.openxmlformats.org/presentationml/2006/main" xmlns:r="http://schemas.openxmlformats.org/officeDocument/2006/relationships" xmlns:p14="http://schemas.microsoft.com/office/powerpoint/2010/main" xmlns:p15="http://schemas.microsoft.com/office/powerpoint/2012/main" xmlns:mc="http://schemas.openxmlformats.org/markup-compatibility/2006">
+<p:sld xmlns:a="http://schemas.openxmlformats.org/drawingml/2006/main" xmlns:r="http://schemas.openxmlformats.org/officeDocument/2006/relationships" xmlns:p="http://schemas.openxmlformats.org/presentationml/2006/main">
   <p:cSld>
     <p:spTree>
       <p:nvGrpSpPr>
@@ -3415,6 +3803,7 @@
         </p:spPr>
         <p:txBody>
           <a:bodyPr anchor="ctr"/>
+          <a:lstStyle/>
           <a:p>
             <a:pPr algn="ctr">
               <a:lnSpc>
@@ -3422,26 +3811,26 @@
               </a:lnSpc>
             </a:pPr>
             <a:r>
-              <a:rPr b="0" lang="en-US" sz="4000" spc="-1" strike="noStrike">
-                <a:solidFill>
-                  <a:srgbClr val="1cade4"/>
-                </a:solidFill>
-                <a:uFill>
-                  <a:solidFill>
-                    <a:srgbClr val="ffffff"/>
+              <a:rPr lang="en-US" sz="4000" b="0" strike="noStrike" spc="-1">
+                <a:solidFill>
+                  <a:srgbClr val="1CADE4"/>
+                </a:solidFill>
+                <a:uFill>
+                  <a:solidFill>
+                    <a:srgbClr val="FFFFFF"/>
                   </a:solidFill>
                 </a:uFill>
                 <a:latin typeface="Century Gothic"/>
               </a:rPr>
               <a:t>Cider Retrospective</a:t>
             </a:r>
-            <a:endParaRPr b="0" lang="en-US" sz="1800" spc="-1" strike="noStrike">
-              <a:solidFill>
-                <a:srgbClr val="000000"/>
-              </a:solidFill>
-              <a:uFill>
-                <a:solidFill>
-                  <a:srgbClr val="ffffff"/>
+            <a:endParaRPr lang="en-US" sz="1800" b="0" strike="noStrike" spc="-1">
+              <a:solidFill>
+                <a:srgbClr val="000000"/>
+              </a:solidFill>
+              <a:uFill>
+                <a:solidFill>
+                  <a:srgbClr val="FFFFFF"/>
                 </a:solidFill>
               </a:uFill>
               <a:latin typeface="Century Gothic"/>
@@ -3470,8 +3859,9 @@
         </p:spPr>
         <p:txBody>
           <a:bodyPr/>
-          <a:p>
-            <a:pPr lvl="1" marL="457200" indent="-182520">
+          <a:lstStyle/>
+          <a:p>
+            <a:pPr marL="457200" lvl="1" indent="-182520">
               <a:lnSpc>
                 <a:spcPct val="100000"/>
               </a:lnSpc>
@@ -3482,13 +3872,13 @@
               <a:buChar char="◦"/>
             </a:pPr>
             <a:r>
-              <a:rPr b="1" lang="en-US" sz="1800" spc="-1" strike="noStrike">
+              <a:rPr lang="en-US" sz="1800" b="1" strike="noStrike" spc="-1">
                 <a:solidFill>
                   <a:srgbClr val="000000"/>
                 </a:solidFill>
                 <a:uFill>
                   <a:solidFill>
-                    <a:srgbClr val="ffffff"/>
+                    <a:srgbClr val="FFFFFF"/>
                   </a:solidFill>
                 </a:uFill>
                 <a:latin typeface="Century Gothic"/>
@@ -3496,33 +3886,33 @@
               <a:t>What Can I do to Improve</a:t>
             </a:r>
             <a:r>
-              <a:rPr b="0" lang="en-US" sz="1600" spc="-1" strike="noStrike">
+              <a:rPr lang="en-US" sz="1600" b="0" strike="noStrike" spc="-1">
                 <a:solidFill>
                   <a:srgbClr val="000000"/>
                 </a:solidFill>
                 <a:uFill>
                   <a:solidFill>
-                    <a:srgbClr val="ffffff"/>
+                    <a:srgbClr val="FFFFFF"/>
                   </a:solidFill>
                 </a:uFill>
                 <a:latin typeface="Century Gothic"/>
               </a:rPr>
               <a:t>?</a:t>
             </a:r>
-            <a:endParaRPr b="0" lang="en-US" sz="1400" spc="-1" strike="noStrike">
-              <a:solidFill>
-                <a:srgbClr val="000000"/>
-              </a:solidFill>
-              <a:uFill>
-                <a:solidFill>
-                  <a:srgbClr val="ffffff"/>
-                </a:solidFill>
-              </a:uFill>
-              <a:latin typeface="Century Gothic"/>
-            </a:endParaRPr>
-          </a:p>
-          <a:p>
-            <a:pPr lvl="3" marL="1005840" indent="-182520">
+            <a:endParaRPr lang="en-US" sz="1400" b="0" strike="noStrike" spc="-1">
+              <a:solidFill>
+                <a:srgbClr val="000000"/>
+              </a:solidFill>
+              <a:uFill>
+                <a:solidFill>
+                  <a:srgbClr val="FFFFFF"/>
+                </a:solidFill>
+              </a:uFill>
+              <a:latin typeface="Century Gothic"/>
+            </a:endParaRPr>
+          </a:p>
+          <a:p>
+            <a:pPr marL="1005840" lvl="3" indent="-182520">
               <a:lnSpc>
                 <a:spcPct val="100000"/>
               </a:lnSpc>
@@ -3533,33 +3923,33 @@
               <a:buChar char="◦"/>
             </a:pPr>
             <a:r>
-              <a:rPr b="0" lang="en-US" sz="1600" spc="-1" strike="noStrike">
+              <a:rPr lang="en-US" sz="1600" b="0" strike="noStrike" spc="-1">
                 <a:solidFill>
                   <a:srgbClr val="000000"/>
                 </a:solidFill>
                 <a:uFill>
                   <a:solidFill>
-                    <a:srgbClr val="ffffff"/>
+                    <a:srgbClr val="FFFFFF"/>
                   </a:solidFill>
                 </a:uFill>
                 <a:latin typeface="Century Gothic"/>
               </a:rPr>
               <a:t>Christian</a:t>
             </a:r>
-            <a:endParaRPr b="0" lang="en-US" sz="1400" spc="-1" strike="noStrike">
-              <a:solidFill>
-                <a:srgbClr val="000000"/>
-              </a:solidFill>
-              <a:uFill>
-                <a:solidFill>
-                  <a:srgbClr val="ffffff"/>
-                </a:solidFill>
-              </a:uFill>
-              <a:latin typeface="Century Gothic"/>
-            </a:endParaRPr>
-          </a:p>
-          <a:p>
-            <a:pPr lvl="4" marL="1598400" indent="-342720">
+            <a:endParaRPr lang="en-US" sz="1400" b="0" strike="noStrike" spc="-1">
+              <a:solidFill>
+                <a:srgbClr val="000000"/>
+              </a:solidFill>
+              <a:uFill>
+                <a:solidFill>
+                  <a:srgbClr val="FFFFFF"/>
+                </a:solidFill>
+              </a:uFill>
+              <a:latin typeface="Century Gothic"/>
+            </a:endParaRPr>
+          </a:p>
+          <a:p>
+            <a:pPr marL="1598400" lvl="4" indent="-342720">
               <a:lnSpc>
                 <a:spcPct val="100000"/>
               </a:lnSpc>
@@ -3570,33 +3960,33 @@
               <a:buAutoNum type="arabicPeriod"/>
             </a:pPr>
             <a:r>
-              <a:rPr b="0" lang="en-US" sz="1400" spc="-1" strike="noStrike">
+              <a:rPr lang="en-US" sz="1400" b="0" strike="noStrike" spc="-1">
                 <a:solidFill>
                   <a:srgbClr val="000000"/>
                 </a:solidFill>
                 <a:uFill>
                   <a:solidFill>
-                    <a:srgbClr val="ffffff"/>
+                    <a:srgbClr val="FFFFFF"/>
                   </a:solidFill>
                 </a:uFill>
                 <a:latin typeface="Century Gothic"/>
               </a:rPr>
               <a:t>If I had the time, it would have helped to put more effort into learning Android Studio.</a:t>
             </a:r>
-            <a:endParaRPr b="0" lang="en-US" sz="2000" spc="-1" strike="noStrike">
-              <a:solidFill>
-                <a:srgbClr val="000000"/>
-              </a:solidFill>
-              <a:uFill>
-                <a:solidFill>
-                  <a:srgbClr val="ffffff"/>
-                </a:solidFill>
-              </a:uFill>
-              <a:latin typeface="Century Gothic"/>
-            </a:endParaRPr>
-          </a:p>
-          <a:p>
-            <a:pPr lvl="4" marL="1598400" indent="-342720">
+            <a:endParaRPr lang="en-US" sz="2000" b="0" strike="noStrike" spc="-1">
+              <a:solidFill>
+                <a:srgbClr val="000000"/>
+              </a:solidFill>
+              <a:uFill>
+                <a:solidFill>
+                  <a:srgbClr val="FFFFFF"/>
+                </a:solidFill>
+              </a:uFill>
+              <a:latin typeface="Century Gothic"/>
+            </a:endParaRPr>
+          </a:p>
+          <a:p>
+            <a:pPr marL="1598400" lvl="4" indent="-342720">
               <a:lnSpc>
                 <a:spcPct val="100000"/>
               </a:lnSpc>
@@ -3607,46 +3997,46 @@
               <a:buAutoNum type="arabicPeriod"/>
             </a:pPr>
             <a:r>
-              <a:rPr b="0" lang="en-US" sz="1400" spc="-1" strike="noStrike">
+              <a:rPr lang="en-US" sz="1400" b="0" strike="noStrike" spc="-1">
                 <a:solidFill>
                   <a:srgbClr val="000000"/>
                 </a:solidFill>
                 <a:uFill>
                   <a:solidFill>
-                    <a:srgbClr val="ffffff"/>
+                    <a:srgbClr val="FFFFFF"/>
                   </a:solidFill>
                 </a:uFill>
                 <a:latin typeface="Century Gothic"/>
               </a:rPr>
               <a:t>Become proficient in Java and gain a more thorough understanding of OO concepts.</a:t>
             </a:r>
-            <a:endParaRPr b="0" lang="en-US" sz="2000" spc="-1" strike="noStrike">
-              <a:solidFill>
-                <a:srgbClr val="000000"/>
-              </a:solidFill>
-              <a:uFill>
-                <a:solidFill>
-                  <a:srgbClr val="ffffff"/>
-                </a:solidFill>
-              </a:uFill>
-              <a:latin typeface="Century Gothic"/>
-            </a:endParaRPr>
-          </a:p>
-          <a:p>
-            <a:endParaRPr b="0" lang="en-US" sz="1800" spc="-1" strike="noStrike">
-              <a:solidFill>
-                <a:srgbClr val="000000"/>
-              </a:solidFill>
-              <a:uFill>
-                <a:solidFill>
-                  <a:srgbClr val="ffffff"/>
-                </a:solidFill>
-              </a:uFill>
-              <a:latin typeface="Century Gothic"/>
-            </a:endParaRPr>
-          </a:p>
-          <a:p>
-            <a:pPr lvl="3" marL="1005840" indent="-182520">
+            <a:endParaRPr lang="en-US" sz="2000" b="0" strike="noStrike" spc="-1">
+              <a:solidFill>
+                <a:srgbClr val="000000"/>
+              </a:solidFill>
+              <a:uFill>
+                <a:solidFill>
+                  <a:srgbClr val="FFFFFF"/>
+                </a:solidFill>
+              </a:uFill>
+              <a:latin typeface="Century Gothic"/>
+            </a:endParaRPr>
+          </a:p>
+          <a:p>
+            <a:endParaRPr lang="en-US" sz="1800" b="0" strike="noStrike" spc="-1">
+              <a:solidFill>
+                <a:srgbClr val="000000"/>
+              </a:solidFill>
+              <a:uFill>
+                <a:solidFill>
+                  <a:srgbClr val="FFFFFF"/>
+                </a:solidFill>
+              </a:uFill>
+              <a:latin typeface="Century Gothic"/>
+            </a:endParaRPr>
+          </a:p>
+          <a:p>
+            <a:pPr marL="1005840" lvl="3" indent="-182520">
               <a:lnSpc>
                 <a:spcPct val="100000"/>
               </a:lnSpc>
@@ -3657,33 +4047,33 @@
               <a:buChar char="◦"/>
             </a:pPr>
             <a:r>
-              <a:rPr b="0" lang="en-US" sz="1600" spc="-1" strike="noStrike">
+              <a:rPr lang="en-US" sz="1600" b="0" strike="noStrike" spc="-1">
                 <a:solidFill>
                   <a:srgbClr val="000000"/>
                 </a:solidFill>
                 <a:uFill>
                   <a:solidFill>
-                    <a:srgbClr val="ffffff"/>
+                    <a:srgbClr val="FFFFFF"/>
                   </a:solidFill>
                 </a:uFill>
                 <a:latin typeface="Century Gothic"/>
               </a:rPr>
               <a:t>Nick</a:t>
             </a:r>
-            <a:endParaRPr b="0" lang="en-US" sz="1400" spc="-1" strike="noStrike">
-              <a:solidFill>
-                <a:srgbClr val="000000"/>
-              </a:solidFill>
-              <a:uFill>
-                <a:solidFill>
-                  <a:srgbClr val="ffffff"/>
-                </a:solidFill>
-              </a:uFill>
-              <a:latin typeface="Century Gothic"/>
-            </a:endParaRPr>
-          </a:p>
-          <a:p>
-            <a:pPr lvl="4" marL="1598400" indent="-342720">
+            <a:endParaRPr lang="en-US" sz="1400" b="0" strike="noStrike" spc="-1">
+              <a:solidFill>
+                <a:srgbClr val="000000"/>
+              </a:solidFill>
+              <a:uFill>
+                <a:solidFill>
+                  <a:srgbClr val="FFFFFF"/>
+                </a:solidFill>
+              </a:uFill>
+              <a:latin typeface="Century Gothic"/>
+            </a:endParaRPr>
+          </a:p>
+          <a:p>
+            <a:pPr marL="1598400" lvl="4" indent="-342720">
               <a:lnSpc>
                 <a:spcPct val="100000"/>
               </a:lnSpc>
@@ -3694,33 +4084,33 @@
               <a:buAutoNum type="arabicPeriod"/>
             </a:pPr>
             <a:r>
-              <a:rPr b="0" lang="en-US" sz="1400" spc="-1" strike="noStrike">
+              <a:rPr lang="en-US" sz="1400" b="0" strike="noStrike" spc="-1">
                 <a:solidFill>
                   <a:srgbClr val="000000"/>
                 </a:solidFill>
                 <a:uFill>
                   <a:solidFill>
-                    <a:srgbClr val="ffffff"/>
+                    <a:srgbClr val="FFFFFF"/>
                   </a:solidFill>
                 </a:uFill>
                 <a:latin typeface="Century Gothic"/>
               </a:rPr>
               <a:t>Thing 1</a:t>
             </a:r>
-            <a:endParaRPr b="0" lang="en-US" sz="2000" spc="-1" strike="noStrike">
-              <a:solidFill>
-                <a:srgbClr val="000000"/>
-              </a:solidFill>
-              <a:uFill>
-                <a:solidFill>
-                  <a:srgbClr val="ffffff"/>
-                </a:solidFill>
-              </a:uFill>
-              <a:latin typeface="Century Gothic"/>
-            </a:endParaRPr>
-          </a:p>
-          <a:p>
-            <a:pPr lvl="4" marL="1598400" indent="-342720">
+            <a:endParaRPr lang="en-US" sz="2000" b="0" strike="noStrike" spc="-1">
+              <a:solidFill>
+                <a:srgbClr val="000000"/>
+              </a:solidFill>
+              <a:uFill>
+                <a:solidFill>
+                  <a:srgbClr val="FFFFFF"/>
+                </a:solidFill>
+              </a:uFill>
+              <a:latin typeface="Century Gothic"/>
+            </a:endParaRPr>
+          </a:p>
+          <a:p>
+            <a:pPr marL="1598400" lvl="4" indent="-342720">
               <a:lnSpc>
                 <a:spcPct val="100000"/>
               </a:lnSpc>
@@ -3731,46 +4121,46 @@
               <a:buAutoNum type="arabicPeriod"/>
             </a:pPr>
             <a:r>
-              <a:rPr b="0" lang="en-US" sz="1400" spc="-1" strike="noStrike">
+              <a:rPr lang="en-US" sz="1400" b="0" strike="noStrike" spc="-1">
                 <a:solidFill>
                   <a:srgbClr val="000000"/>
                 </a:solidFill>
                 <a:uFill>
                   <a:solidFill>
-                    <a:srgbClr val="ffffff"/>
+                    <a:srgbClr val="FFFFFF"/>
                   </a:solidFill>
                 </a:uFill>
                 <a:latin typeface="Century Gothic"/>
               </a:rPr>
               <a:t>Thing 2</a:t>
             </a:r>
-            <a:endParaRPr b="0" lang="en-US" sz="2000" spc="-1" strike="noStrike">
-              <a:solidFill>
-                <a:srgbClr val="000000"/>
-              </a:solidFill>
-              <a:uFill>
-                <a:solidFill>
-                  <a:srgbClr val="ffffff"/>
-                </a:solidFill>
-              </a:uFill>
-              <a:latin typeface="Century Gothic"/>
-            </a:endParaRPr>
-          </a:p>
-          <a:p>
-            <a:endParaRPr b="0" lang="en-US" sz="1800" spc="-1" strike="noStrike">
-              <a:solidFill>
-                <a:srgbClr val="000000"/>
-              </a:solidFill>
-              <a:uFill>
-                <a:solidFill>
-                  <a:srgbClr val="ffffff"/>
-                </a:solidFill>
-              </a:uFill>
-              <a:latin typeface="Century Gothic"/>
-            </a:endParaRPr>
-          </a:p>
-          <a:p>
-            <a:pPr lvl="3" marL="1005840" indent="-182520">
+            <a:endParaRPr lang="en-US" sz="2000" b="0" strike="noStrike" spc="-1">
+              <a:solidFill>
+                <a:srgbClr val="000000"/>
+              </a:solidFill>
+              <a:uFill>
+                <a:solidFill>
+                  <a:srgbClr val="FFFFFF"/>
+                </a:solidFill>
+              </a:uFill>
+              <a:latin typeface="Century Gothic"/>
+            </a:endParaRPr>
+          </a:p>
+          <a:p>
+            <a:endParaRPr lang="en-US" sz="1800" b="0" strike="noStrike" spc="-1">
+              <a:solidFill>
+                <a:srgbClr val="000000"/>
+              </a:solidFill>
+              <a:uFill>
+                <a:solidFill>
+                  <a:srgbClr val="FFFFFF"/>
+                </a:solidFill>
+              </a:uFill>
+              <a:latin typeface="Century Gothic"/>
+            </a:endParaRPr>
+          </a:p>
+          <a:p>
+            <a:pPr marL="1005840" lvl="3" indent="-182520">
               <a:lnSpc>
                 <a:spcPct val="100000"/>
               </a:lnSpc>
@@ -3781,33 +4171,33 @@
               <a:buChar char="◦"/>
             </a:pPr>
             <a:r>
-              <a:rPr b="0" lang="en-US" sz="1600" spc="-1" strike="noStrike">
+              <a:rPr lang="en-US" sz="1600" b="0" strike="noStrike" spc="-1">
                 <a:solidFill>
                   <a:srgbClr val="000000"/>
                 </a:solidFill>
                 <a:uFill>
                   <a:solidFill>
-                    <a:srgbClr val="ffffff"/>
+                    <a:srgbClr val="FFFFFF"/>
                   </a:solidFill>
                 </a:uFill>
                 <a:latin typeface="Century Gothic"/>
               </a:rPr>
               <a:t>Ed</a:t>
             </a:r>
-            <a:endParaRPr b="0" lang="en-US" sz="1400" spc="-1" strike="noStrike">
-              <a:solidFill>
-                <a:srgbClr val="000000"/>
-              </a:solidFill>
-              <a:uFill>
-                <a:solidFill>
-                  <a:srgbClr val="ffffff"/>
-                </a:solidFill>
-              </a:uFill>
-              <a:latin typeface="Century Gothic"/>
-            </a:endParaRPr>
-          </a:p>
-          <a:p>
-            <a:pPr lvl="4" marL="1598400" indent="-342720">
+            <a:endParaRPr lang="en-US" sz="1400" b="0" strike="noStrike" spc="-1">
+              <a:solidFill>
+                <a:srgbClr val="000000"/>
+              </a:solidFill>
+              <a:uFill>
+                <a:solidFill>
+                  <a:srgbClr val="FFFFFF"/>
+                </a:solidFill>
+              </a:uFill>
+              <a:latin typeface="Century Gothic"/>
+            </a:endParaRPr>
+          </a:p>
+          <a:p>
+            <a:pPr marL="1598400" lvl="4" indent="-342720">
               <a:lnSpc>
                 <a:spcPct val="100000"/>
               </a:lnSpc>
@@ -3818,33 +4208,33 @@
               <a:buAutoNum type="arabicPeriod"/>
             </a:pPr>
             <a:r>
-              <a:rPr b="0" lang="en-US" sz="1400" spc="-1" strike="noStrike">
+              <a:rPr lang="en-US" sz="1400" b="0" strike="noStrike" spc="-1">
                 <a:solidFill>
                   <a:srgbClr val="000000"/>
                 </a:solidFill>
                 <a:uFill>
                   <a:solidFill>
-                    <a:srgbClr val="ffffff"/>
+                    <a:srgbClr val="FFFFFF"/>
                   </a:solidFill>
                 </a:uFill>
                 <a:latin typeface="Century Gothic"/>
               </a:rPr>
               <a:t>Thing 1</a:t>
             </a:r>
-            <a:endParaRPr b="0" lang="en-US" sz="2000" spc="-1" strike="noStrike">
-              <a:solidFill>
-                <a:srgbClr val="000000"/>
-              </a:solidFill>
-              <a:uFill>
-                <a:solidFill>
-                  <a:srgbClr val="ffffff"/>
-                </a:solidFill>
-              </a:uFill>
-              <a:latin typeface="Century Gothic"/>
-            </a:endParaRPr>
-          </a:p>
-          <a:p>
-            <a:pPr lvl="4" marL="1598400" indent="-342720">
+            <a:endParaRPr lang="en-US" sz="2000" b="0" strike="noStrike" spc="-1">
+              <a:solidFill>
+                <a:srgbClr val="000000"/>
+              </a:solidFill>
+              <a:uFill>
+                <a:solidFill>
+                  <a:srgbClr val="FFFFFF"/>
+                </a:solidFill>
+              </a:uFill>
+              <a:latin typeface="Century Gothic"/>
+            </a:endParaRPr>
+          </a:p>
+          <a:p>
+            <a:pPr marL="1598400" lvl="4" indent="-342720">
               <a:lnSpc>
                 <a:spcPct val="100000"/>
               </a:lnSpc>
@@ -3855,91 +4245,91 @@
               <a:buAutoNum type="arabicPeriod"/>
             </a:pPr>
             <a:r>
-              <a:rPr b="0" lang="en-US" sz="1400" spc="-1" strike="noStrike">
+              <a:rPr lang="en-US" sz="1400" b="0" strike="noStrike" spc="-1">
                 <a:solidFill>
                   <a:srgbClr val="000000"/>
                 </a:solidFill>
                 <a:uFill>
                   <a:solidFill>
-                    <a:srgbClr val="ffffff"/>
+                    <a:srgbClr val="FFFFFF"/>
                   </a:solidFill>
                 </a:uFill>
                 <a:latin typeface="Century Gothic"/>
               </a:rPr>
               <a:t>Thing 2</a:t>
             </a:r>
-            <a:endParaRPr b="0" lang="en-US" sz="2000" spc="-1" strike="noStrike">
-              <a:solidFill>
-                <a:srgbClr val="000000"/>
-              </a:solidFill>
-              <a:uFill>
-                <a:solidFill>
-                  <a:srgbClr val="ffffff"/>
-                </a:solidFill>
-              </a:uFill>
-              <a:latin typeface="Century Gothic"/>
-            </a:endParaRPr>
-          </a:p>
-          <a:p>
-            <a:endParaRPr b="0" lang="en-US" sz="1800" spc="-1" strike="noStrike">
-              <a:solidFill>
-                <a:srgbClr val="000000"/>
-              </a:solidFill>
-              <a:uFill>
-                <a:solidFill>
-                  <a:srgbClr val="ffffff"/>
-                </a:solidFill>
-              </a:uFill>
-              <a:latin typeface="Century Gothic"/>
-            </a:endParaRPr>
-          </a:p>
-          <a:p>
-            <a:endParaRPr b="0" lang="en-US" sz="1800" spc="-1" strike="noStrike">
-              <a:solidFill>
-                <a:srgbClr val="000000"/>
-              </a:solidFill>
-              <a:uFill>
-                <a:solidFill>
-                  <a:srgbClr val="ffffff"/>
-                </a:solidFill>
-              </a:uFill>
-              <a:latin typeface="Century Gothic"/>
-            </a:endParaRPr>
-          </a:p>
-          <a:p>
-            <a:endParaRPr b="0" lang="en-US" sz="1800" spc="-1" strike="noStrike">
-              <a:solidFill>
-                <a:srgbClr val="000000"/>
-              </a:solidFill>
-              <a:uFill>
-                <a:solidFill>
-                  <a:srgbClr val="ffffff"/>
-                </a:solidFill>
-              </a:uFill>
-              <a:latin typeface="Century Gothic"/>
-            </a:endParaRPr>
-          </a:p>
-          <a:p>
-            <a:endParaRPr b="0" lang="en-US" sz="1800" spc="-1" strike="noStrike">
-              <a:solidFill>
-                <a:srgbClr val="000000"/>
-              </a:solidFill>
-              <a:uFill>
-                <a:solidFill>
-                  <a:srgbClr val="ffffff"/>
-                </a:solidFill>
-              </a:uFill>
-              <a:latin typeface="Century Gothic"/>
-            </a:endParaRPr>
-          </a:p>
-          <a:p>
-            <a:endParaRPr b="0" lang="en-US" sz="1800" spc="-1" strike="noStrike">
-              <a:solidFill>
-                <a:srgbClr val="000000"/>
-              </a:solidFill>
-              <a:uFill>
-                <a:solidFill>
-                  <a:srgbClr val="ffffff"/>
+            <a:endParaRPr lang="en-US" sz="2000" b="0" strike="noStrike" spc="-1">
+              <a:solidFill>
+                <a:srgbClr val="000000"/>
+              </a:solidFill>
+              <a:uFill>
+                <a:solidFill>
+                  <a:srgbClr val="FFFFFF"/>
+                </a:solidFill>
+              </a:uFill>
+              <a:latin typeface="Century Gothic"/>
+            </a:endParaRPr>
+          </a:p>
+          <a:p>
+            <a:endParaRPr lang="en-US" sz="1800" b="0" strike="noStrike" spc="-1">
+              <a:solidFill>
+                <a:srgbClr val="000000"/>
+              </a:solidFill>
+              <a:uFill>
+                <a:solidFill>
+                  <a:srgbClr val="FFFFFF"/>
+                </a:solidFill>
+              </a:uFill>
+              <a:latin typeface="Century Gothic"/>
+            </a:endParaRPr>
+          </a:p>
+          <a:p>
+            <a:endParaRPr lang="en-US" sz="1800" b="0" strike="noStrike" spc="-1">
+              <a:solidFill>
+                <a:srgbClr val="000000"/>
+              </a:solidFill>
+              <a:uFill>
+                <a:solidFill>
+                  <a:srgbClr val="FFFFFF"/>
+                </a:solidFill>
+              </a:uFill>
+              <a:latin typeface="Century Gothic"/>
+            </a:endParaRPr>
+          </a:p>
+          <a:p>
+            <a:endParaRPr lang="en-US" sz="1800" b="0" strike="noStrike" spc="-1">
+              <a:solidFill>
+                <a:srgbClr val="000000"/>
+              </a:solidFill>
+              <a:uFill>
+                <a:solidFill>
+                  <a:srgbClr val="FFFFFF"/>
+                </a:solidFill>
+              </a:uFill>
+              <a:latin typeface="Century Gothic"/>
+            </a:endParaRPr>
+          </a:p>
+          <a:p>
+            <a:endParaRPr lang="en-US" sz="1800" b="0" strike="noStrike" spc="-1">
+              <a:solidFill>
+                <a:srgbClr val="000000"/>
+              </a:solidFill>
+              <a:uFill>
+                <a:solidFill>
+                  <a:srgbClr val="FFFFFF"/>
+                </a:solidFill>
+              </a:uFill>
+              <a:latin typeface="Century Gothic"/>
+            </a:endParaRPr>
+          </a:p>
+          <a:p>
+            <a:endParaRPr lang="en-US" sz="1800" b="0" strike="noStrike" spc="-1">
+              <a:solidFill>
+                <a:srgbClr val="000000"/>
+              </a:solidFill>
+              <a:uFill>
+                <a:solidFill>
+                  <a:srgbClr val="FFFFFF"/>
                 </a:solidFill>
               </a:uFill>
               <a:latin typeface="Century Gothic"/>
@@ -3951,13 +4341,13 @@
                 <a:spcPct val="100000"/>
               </a:lnSpc>
             </a:pPr>
-            <a:endParaRPr b="0" lang="en-US" sz="1800" spc="-1" strike="noStrike">
-              <a:solidFill>
-                <a:srgbClr val="000000"/>
-              </a:solidFill>
-              <a:uFill>
-                <a:solidFill>
-                  <a:srgbClr val="ffffff"/>
+            <a:endParaRPr lang="en-US" sz="1800" b="0" strike="noStrike" spc="-1">
+              <a:solidFill>
+                <a:srgbClr val="000000"/>
+              </a:solidFill>
+              <a:uFill>
+                <a:solidFill>
+                  <a:srgbClr val="FFFFFF"/>
                 </a:solidFill>
               </a:uFill>
               <a:latin typeface="Century Gothic"/>
@@ -3967,22 +4357,25 @@
       </p:sp>
     </p:spTree>
   </p:cSld>
+  <p:clrMapOvr>
+    <a:masterClrMapping/>
+  </p:clrMapOvr>
   <p:timing>
     <p:tnLst>
       <p:par>
-        <p:cTn id="5" dur="indefinite" restart="never" nodeType="tmRoot">
+        <p:cTn id="1" dur="indefinite" restart="never" nodeType="tmRoot">
           <p:childTnLst>
             <p:seq>
-              <p:cTn id="6" nodeType="mainSeq"/>
+              <p:cTn id="2" nodeType="mainSeq"/>
               <p:prevCondLst>
-                <p:cond delay="0" evt="onPrev">
+                <p:cond evt="onPrev" delay="0">
                   <p:tgtEl>
                     <p:sldTgt/>
                   </p:tgtEl>
                 </p:cond>
               </p:prevCondLst>
               <p:nextCondLst>
-                <p:cond delay="0" evt="onNext">
+                <p:cond evt="onNext" delay="0">
                   <p:tgtEl>
                     <p:sldTgt/>
                   </p:tgtEl>
@@ -4217,5 +4610,7 @@
       </a:bgFillStyleLst>
     </a:fmtScheme>
   </a:themeElements>
+  <a:objectDefaults/>
+  <a:extraClrSchemeLst/>
 </a:theme>
 </file>
</xml_diff>

<commit_message>
Zack's Contribution to Retrospective
</commit_message>
<xml_diff>
--- a/Presentations/Final_Retrospective.pptx
+++ b/Presentations/Final_Retrospective.pptx
@@ -106,6 +106,11 @@
       </a:defRPr>
     </a:lvl9pPr>
   </p:defaultTextStyle>
+  <p:extLst>
+    <p:ext uri="{EFAFB233-063F-42B5-8137-9DF3F51BA10A}">
+      <p15:sldGuideLst xmlns:p15="http://schemas.microsoft.com/office/powerpoint/2012/main"/>
+    </p:ext>
+  </p:extLst>
 </p:presentation>
 </file>
 
@@ -3445,7 +3450,7 @@
               <a:buAutoNum type="arabicPeriod"/>
             </a:pPr>
             <a:r>
-              <a:rPr lang="en-US" sz="1400" spc="-1" dirty="0" smtClean="0">
+              <a:rPr lang="en-US" sz="1400" spc="-1" dirty="0">
                 <a:solidFill>
                   <a:srgbClr val="000000"/>
                 </a:solidFill>
@@ -3482,7 +3487,7 @@
               <a:buAutoNum type="arabicPeriod"/>
             </a:pPr>
             <a:r>
-              <a:rPr lang="en-US" sz="1400" spc="-1" dirty="0" smtClean="0">
+              <a:rPr lang="en-US" sz="1400" spc="-1" dirty="0">
                 <a:solidFill>
                   <a:srgbClr val="000000"/>
                 </a:solidFill>
@@ -3493,21 +3498,7 @@
                 </a:uFill>
                 <a:latin typeface="Century Gothic"/>
               </a:rPr>
-              <a:t>Work in Android SDK on desktop computer—which can handle emulation—instead of on laptop—which can’t </a:t>
-            </a:r>
-            <a:r>
-              <a:rPr lang="en-US" sz="1400" spc="-1" smtClean="0">
-                <a:solidFill>
-                  <a:srgbClr val="000000"/>
-                </a:solidFill>
-                <a:uFill>
-                  <a:solidFill>
-                    <a:srgbClr val="FFFFFF"/>
-                  </a:solidFill>
-                </a:uFill>
-                <a:latin typeface="Century Gothic"/>
-              </a:rPr>
-              <a:t>handle emulation.</a:t>
+              <a:t>Work in Android SDK on desktop computer—which can handle emulation—instead of on laptop—which can’t handle emulation.</a:t>
             </a:r>
             <a:endParaRPr lang="en-US" sz="2000" b="0" strike="noStrike" spc="-1" dirty="0">
               <a:solidFill>
@@ -3594,7 +3585,7 @@
                 </a:uFill>
                 <a:latin typeface="Century Gothic"/>
               </a:rPr>
-              <a:t>Thing 1</a:t>
+              <a:t>Improve proficiency in development environment – Android Studio requires considerable investment to become proficient in and warrants a semester of study in of itself, let alone learning and developing a project at the same time.</a:t>
             </a:r>
             <a:endParaRPr lang="en-US" sz="2000" b="0" strike="noStrike" spc="-1" dirty="0">
               <a:solidFill>
@@ -3631,7 +3622,35 @@
                 </a:uFill>
                 <a:latin typeface="Century Gothic"/>
               </a:rPr>
-              <a:t>Thing 2</a:t>
+              <a:t>Break up sprin</a:t>
+            </a:r>
+            <a:r>
+              <a:rPr lang="en-US" sz="1400" spc="-1" dirty="0">
+                <a:solidFill>
+                  <a:srgbClr val="000000"/>
+                </a:solidFill>
+                <a:uFill>
+                  <a:solidFill>
+                    <a:srgbClr val="FFFFFF"/>
+                  </a:solidFill>
+                </a:uFill>
+                <a:latin typeface="Century Gothic"/>
+              </a:rPr>
+              <a:t>t tasks into smaller artifacts so that team members can more easily understand progress if need be</a:t>
+            </a:r>
+            <a:r>
+              <a:rPr lang="en-US" sz="1400" spc="-1">
+                <a:solidFill>
+                  <a:srgbClr val="000000"/>
+                </a:solidFill>
+                <a:uFill>
+                  <a:solidFill>
+                    <a:srgbClr val="FFFFFF"/>
+                  </a:solidFill>
+                </a:uFill>
+                <a:latin typeface="Century Gothic"/>
+              </a:rPr>
+              <a:t>. </a:t>
             </a:r>
             <a:endParaRPr lang="en-US" sz="2000" b="0" strike="noStrike" spc="-1" dirty="0">
               <a:solidFill>

</xml_diff>